<commit_message>
causal 논문 experiments 부분 작성중
</commit_message>
<xml_diff>
--- a/papers/review/Causal Incremental Graph Convolution for review.pptx
+++ b/papers/review/Causal Incremental Graph Convolution for review.pptx
@@ -5,7 +5,7 @@
     <p:sldMasterId id="2147483648" r:id="rId1"/>
   </p:sldMasterIdLst>
   <p:notesMasterIdLst>
-    <p:notesMasterId r:id="rId26"/>
+    <p:notesMasterId r:id="rId32"/>
   </p:notesMasterIdLst>
   <p:sldIdLst>
     <p:sldId id="256" r:id="rId2"/>
@@ -31,7 +31,13 @@
     <p:sldId id="279" r:id="rId22"/>
     <p:sldId id="280" r:id="rId23"/>
     <p:sldId id="266" r:id="rId24"/>
-    <p:sldId id="281" r:id="rId25"/>
+    <p:sldId id="282" r:id="rId25"/>
+    <p:sldId id="283" r:id="rId26"/>
+    <p:sldId id="285" r:id="rId27"/>
+    <p:sldId id="286" r:id="rId28"/>
+    <p:sldId id="287" r:id="rId29"/>
+    <p:sldId id="281" r:id="rId30"/>
+    <p:sldId id="284" r:id="rId31"/>
   </p:sldIdLst>
   <p:sldSz cx="12192000" cy="6858000"/>
   <p:notesSz cx="6858000" cy="9144000"/>
@@ -231,7 +237,7 @@
           <a:p>
             <a:fld id="{B4BAEF34-DDA1-41A6-94BB-1D7567B3088F}" type="datetimeFigureOut">
               <a:rPr lang="ko-KR" altLang="en-US" smtClean="0"/>
-              <a:t>2023-03-01</a:t>
+              <a:t>2023-03-02</a:t>
             </a:fld>
             <a:endParaRPr lang="ko-KR" altLang="en-US"/>
           </a:p>
@@ -3107,6 +3113,21 @@
           <a:bodyPr/>
           <a:lstStyle/>
           <a:p>
+            <a:pPr marL="0" indent="0">
+              <a:buNone/>
+            </a:pPr>
+            <a:r>
+              <a:rPr lang="ko-KR" altLang="en-US" dirty="0"/>
+              <a:t>실험 세팅 </a:t>
+            </a:r>
+            <a:r>
+              <a:rPr lang="en-US" altLang="ko-KR" dirty="0"/>
+              <a:t>- </a:t>
+            </a:r>
+            <a:r>
+              <a:rPr lang="ko-KR" altLang="en-US" dirty="0"/>
+              <a:t>데이터셋</a:t>
+            </a:r>
             <a:endParaRPr lang="en-US" altLang="ko-KR" dirty="0"/>
           </a:p>
         </p:txBody>
@@ -3137,7 +3158,971 @@
     </p:spTree>
     <p:extLst>
       <p:ext uri="{BB962C8B-B14F-4D97-AF65-F5344CB8AC3E}">
+        <p14:creationId xmlns:p14="http://schemas.microsoft.com/office/powerpoint/2010/main" val="1356588583"/>
+      </p:ext>
+    </p:extLst>
+  </p:cSld>
+  <p:clrMapOvr>
+    <a:masterClrMapping/>
+  </p:clrMapOvr>
+</p:notes>
+</file>
+
+<file path=ppt/notesSlides/notesSlide24.xml><?xml version="1.0" encoding="utf-8"?>
+<p:notes xmlns:a="http://schemas.openxmlformats.org/drawingml/2006/main" xmlns:r="http://schemas.openxmlformats.org/officeDocument/2006/relationships" xmlns:p="http://schemas.openxmlformats.org/presentationml/2006/main">
+  <p:cSld>
+    <p:spTree>
+      <p:nvGrpSpPr>
+        <p:cNvPr id="1" name=""/>
+        <p:cNvGrpSpPr/>
+        <p:nvPr/>
+      </p:nvGrpSpPr>
+      <p:grpSpPr>
+        <a:xfrm>
+          <a:off x="0" y="0"/>
+          <a:ext cx="0" cy="0"/>
+          <a:chOff x="0" y="0"/>
+          <a:chExt cx="0" cy="0"/>
+        </a:xfrm>
+      </p:grpSpPr>
+      <p:sp>
+        <p:nvSpPr>
+          <p:cNvPr id="2" name="슬라이드 이미지 개체 틀 1"/>
+          <p:cNvSpPr>
+            <a:spLocks noGrp="1" noRot="1" noChangeAspect="1"/>
+          </p:cNvSpPr>
+          <p:nvPr>
+            <p:ph type="sldImg"/>
+          </p:nvPr>
+        </p:nvSpPr>
+        <p:spPr/>
+      </p:sp>
+      <p:sp>
+        <p:nvSpPr>
+          <p:cNvPr id="3" name="슬라이드 노트 개체 틀 2"/>
+          <p:cNvSpPr>
+            <a:spLocks noGrp="1"/>
+          </p:cNvSpPr>
+          <p:nvPr>
+            <p:ph type="body" idx="1"/>
+          </p:nvPr>
+        </p:nvSpPr>
+        <p:spPr/>
+        <p:txBody>
+          <a:bodyPr/>
+          <a:lstStyle/>
+          <a:p>
+            <a:pPr marL="0" indent="0">
+              <a:buNone/>
+            </a:pPr>
+            <a:r>
+              <a:rPr lang="ko-KR" altLang="en-US" dirty="0"/>
+              <a:t>비교 베이스라인</a:t>
+            </a:r>
+            <a:endParaRPr lang="en-US" altLang="ko-KR" dirty="0"/>
+          </a:p>
+          <a:p>
+            <a:pPr marL="0" indent="0">
+              <a:buNone/>
+            </a:pPr>
+            <a:r>
+              <a:rPr lang="ko-KR" altLang="en-US" dirty="0" err="1"/>
+              <a:t>시퀀셜</a:t>
+            </a:r>
+            <a:r>
+              <a:rPr lang="ko-KR" altLang="en-US" dirty="0"/>
+              <a:t> 추천 </a:t>
+            </a:r>
+            <a:r>
+              <a:rPr lang="en-US" altLang="ko-KR" dirty="0"/>
+              <a:t>4</a:t>
+            </a:r>
+            <a:r>
+              <a:rPr lang="ko-KR" altLang="en-US" dirty="0"/>
+              <a:t>가지</a:t>
+            </a:r>
+            <a:endParaRPr lang="en-US" altLang="ko-KR" dirty="0"/>
+          </a:p>
+          <a:p>
+            <a:pPr marL="0" indent="0">
+              <a:buNone/>
+            </a:pPr>
+            <a:r>
+              <a:rPr lang="ko-KR" altLang="en-US" dirty="0"/>
+              <a:t>다른 재훈련 방식 </a:t>
+            </a:r>
+            <a:r>
+              <a:rPr lang="en-US" altLang="ko-KR" dirty="0"/>
+              <a:t>5</a:t>
+            </a:r>
+            <a:r>
+              <a:rPr lang="ko-KR" altLang="en-US" dirty="0"/>
+              <a:t>가지</a:t>
+            </a:r>
+            <a:endParaRPr lang="en-US" altLang="ko-KR" dirty="0"/>
+          </a:p>
+        </p:txBody>
+      </p:sp>
+      <p:sp>
+        <p:nvSpPr>
+          <p:cNvPr id="4" name="슬라이드 번호 개체 틀 3"/>
+          <p:cNvSpPr>
+            <a:spLocks noGrp="1"/>
+          </p:cNvSpPr>
+          <p:nvPr>
+            <p:ph type="sldNum" sz="quarter" idx="5"/>
+          </p:nvPr>
+        </p:nvSpPr>
+        <p:spPr/>
+        <p:txBody>
+          <a:bodyPr/>
+          <a:lstStyle/>
+          <a:p>
+            <a:fld id="{E3508E54-26A4-461A-9177-07CC1B35B5F2}" type="slidenum">
+              <a:rPr lang="ko-KR" altLang="en-US" smtClean="0"/>
+              <a:t>25</a:t>
+            </a:fld>
+            <a:endParaRPr lang="ko-KR" altLang="en-US"/>
+          </a:p>
+        </p:txBody>
+      </p:sp>
+    </p:spTree>
+    <p:extLst>
+      <p:ext uri="{BB962C8B-B14F-4D97-AF65-F5344CB8AC3E}">
+        <p14:creationId xmlns:p14="http://schemas.microsoft.com/office/powerpoint/2010/main" val="3027702151"/>
+      </p:ext>
+    </p:extLst>
+  </p:cSld>
+  <p:clrMapOvr>
+    <a:masterClrMapping/>
+  </p:clrMapOvr>
+</p:notes>
+</file>
+
+<file path=ppt/notesSlides/notesSlide25.xml><?xml version="1.0" encoding="utf-8"?>
+<p:notes xmlns:a="http://schemas.openxmlformats.org/drawingml/2006/main" xmlns:r="http://schemas.openxmlformats.org/officeDocument/2006/relationships" xmlns:p="http://schemas.openxmlformats.org/presentationml/2006/main">
+  <p:cSld>
+    <p:spTree>
+      <p:nvGrpSpPr>
+        <p:cNvPr id="1" name=""/>
+        <p:cNvGrpSpPr/>
+        <p:nvPr/>
+      </p:nvGrpSpPr>
+      <p:grpSpPr>
+        <a:xfrm>
+          <a:off x="0" y="0"/>
+          <a:ext cx="0" cy="0"/>
+          <a:chOff x="0" y="0"/>
+          <a:chExt cx="0" cy="0"/>
+        </a:xfrm>
+      </p:grpSpPr>
+      <p:sp>
+        <p:nvSpPr>
+          <p:cNvPr id="2" name="슬라이드 이미지 개체 틀 1"/>
+          <p:cNvSpPr>
+            <a:spLocks noGrp="1" noRot="1" noChangeAspect="1"/>
+          </p:cNvSpPr>
+          <p:nvPr>
+            <p:ph type="sldImg"/>
+          </p:nvPr>
+        </p:nvSpPr>
+        <p:spPr/>
+      </p:sp>
+      <p:sp>
+        <p:nvSpPr>
+          <p:cNvPr id="3" name="슬라이드 노트 개체 틀 2"/>
+          <p:cNvSpPr>
+            <a:spLocks noGrp="1"/>
+          </p:cNvSpPr>
+          <p:nvPr>
+            <p:ph type="body" idx="1"/>
+          </p:nvPr>
+        </p:nvSpPr>
+        <p:spPr/>
+        <p:txBody>
+          <a:bodyPr/>
+          <a:lstStyle/>
+          <a:p>
+            <a:pPr marL="0" indent="0">
+              <a:buNone/>
+            </a:pPr>
+            <a:r>
+              <a:rPr lang="en-US" altLang="ko-KR" dirty="0"/>
+              <a:t>B. </a:t>
+            </a:r>
+            <a:r>
+              <a:rPr lang="ko-KR" altLang="en-US" dirty="0" err="1"/>
+              <a:t>포포몬스</a:t>
+            </a:r>
+            <a:r>
+              <a:rPr lang="ko-KR" altLang="en-US" dirty="0"/>
+              <a:t> 비교</a:t>
+            </a:r>
+            <a:endParaRPr lang="en-US" altLang="ko-KR" dirty="0"/>
+          </a:p>
+          <a:p>
+            <a:pPr marL="0" indent="0">
+              <a:buNone/>
+            </a:pPr>
+            <a:r>
+              <a:rPr lang="ko-KR" altLang="en-US" dirty="0"/>
+              <a:t>이는 첫번째 </a:t>
+            </a:r>
+            <a:r>
+              <a:rPr lang="en-US" altLang="ko-KR" dirty="0"/>
+              <a:t>research </a:t>
+            </a:r>
+            <a:r>
+              <a:rPr lang="en-US" altLang="ko-KR" dirty="0" err="1"/>
+              <a:t>questio</a:t>
+            </a:r>
+            <a:r>
+              <a:rPr lang="ko-KR" altLang="en-US" dirty="0"/>
+              <a:t>에 대한 검증이다</a:t>
+            </a:r>
+            <a:r>
+              <a:rPr lang="en-US" altLang="ko-KR" dirty="0"/>
+              <a:t>. Ci </a:t>
+            </a:r>
+            <a:r>
+              <a:rPr lang="en-US" altLang="ko-KR" dirty="0" err="1"/>
+              <a:t>lightgcn</a:t>
+            </a:r>
+            <a:r>
+              <a:rPr lang="ko-KR" altLang="en-US" dirty="0"/>
+              <a:t>이 기존 </a:t>
+            </a:r>
+            <a:r>
+              <a:rPr lang="en-US" altLang="ko-KR" dirty="0" err="1"/>
+              <a:t>retraing</a:t>
+            </a:r>
+            <a:r>
+              <a:rPr lang="en-US" altLang="ko-KR" dirty="0"/>
+              <a:t> method</a:t>
+            </a:r>
+            <a:r>
+              <a:rPr lang="ko-KR" altLang="en-US" dirty="0"/>
+              <a:t>대비 </a:t>
+            </a:r>
+            <a:r>
+              <a:rPr lang="ko-KR" altLang="en-US" dirty="0" err="1"/>
+              <a:t>포포몬스가</a:t>
+            </a:r>
+            <a:r>
+              <a:rPr lang="ko-KR" altLang="en-US" dirty="0"/>
+              <a:t> 나은가</a:t>
+            </a:r>
+            <a:r>
+              <a:rPr lang="en-US" altLang="ko-KR" dirty="0"/>
+              <a:t>?</a:t>
+            </a:r>
+          </a:p>
+          <a:p>
+            <a:pPr marL="0" indent="0">
+              <a:buNone/>
+            </a:pPr>
+            <a:r>
+              <a:rPr lang="ko-KR" altLang="en-US" dirty="0"/>
+              <a:t>표에서 </a:t>
+            </a:r>
+            <a:r>
+              <a:rPr lang="en-US" altLang="ko-KR" dirty="0"/>
+              <a:t>RI</a:t>
+            </a:r>
+            <a:r>
+              <a:rPr lang="ko-KR" altLang="en-US" dirty="0"/>
+              <a:t>는 </a:t>
+            </a:r>
+            <a:r>
+              <a:rPr lang="en-US" altLang="ko-KR" dirty="0"/>
+              <a:t>CI </a:t>
+            </a:r>
+            <a:r>
+              <a:rPr lang="en-US" altLang="ko-KR" dirty="0" err="1"/>
+              <a:t>lightGCN</a:t>
+            </a:r>
+            <a:r>
+              <a:rPr lang="ko-KR" altLang="en-US" dirty="0"/>
+              <a:t>과 비교한 </a:t>
+            </a:r>
+            <a:r>
+              <a:rPr lang="en-US" altLang="ko-KR" dirty="0"/>
+              <a:t>recall 5</a:t>
+            </a:r>
+            <a:r>
+              <a:rPr lang="ko-KR" altLang="en-US" dirty="0"/>
+              <a:t> 점수와 비율이다</a:t>
+            </a:r>
+            <a:r>
+              <a:rPr lang="en-US" altLang="ko-KR" dirty="0"/>
+              <a:t>.</a:t>
+            </a:r>
+          </a:p>
+          <a:p>
+            <a:pPr marL="0" indent="0">
+              <a:buNone/>
+            </a:pPr>
+            <a:endParaRPr lang="en-US" altLang="ko-KR" dirty="0"/>
+          </a:p>
+          <a:p>
+            <a:pPr marL="228600" indent="-228600">
+              <a:buAutoNum type="arabicPeriod"/>
+            </a:pPr>
+            <a:r>
+              <a:rPr lang="en-US" altLang="ko-KR" dirty="0"/>
+              <a:t>Ci</a:t>
+            </a:r>
+            <a:r>
+              <a:rPr lang="ko-KR" altLang="en-US" dirty="0"/>
+              <a:t>는 </a:t>
+            </a:r>
+            <a:r>
+              <a:rPr lang="en-US" altLang="ko-KR" dirty="0"/>
+              <a:t>full</a:t>
+            </a:r>
+            <a:r>
+              <a:rPr lang="ko-KR" altLang="en-US" dirty="0"/>
+              <a:t>과 </a:t>
+            </a:r>
+            <a:r>
+              <a:rPr lang="ko-KR" altLang="en-US" dirty="0" err="1"/>
+              <a:t>파인튜닝보다</a:t>
+            </a:r>
+            <a:r>
+              <a:rPr lang="ko-KR" altLang="en-US" dirty="0"/>
+              <a:t> 모든 </a:t>
+            </a:r>
+            <a:r>
+              <a:rPr lang="ko-KR" altLang="en-US" dirty="0" err="1"/>
+              <a:t>매트릭에서</a:t>
+            </a:r>
+            <a:r>
+              <a:rPr lang="ko-KR" altLang="en-US" dirty="0"/>
+              <a:t> 좋은 성능을 보였다</a:t>
+            </a:r>
+            <a:r>
+              <a:rPr lang="en-US" altLang="ko-KR" dirty="0"/>
+              <a:t>. </a:t>
+            </a:r>
+            <a:r>
+              <a:rPr lang="ko-KR" altLang="en-US" dirty="0"/>
+              <a:t>이는 </a:t>
+            </a:r>
+            <a:r>
+              <a:rPr lang="en-US" altLang="ko-KR" dirty="0"/>
+              <a:t>old graph</a:t>
+            </a:r>
+            <a:r>
+              <a:rPr lang="ko-KR" altLang="en-US" dirty="0"/>
+              <a:t>와 </a:t>
+            </a:r>
+            <a:r>
+              <a:rPr lang="en-US" altLang="ko-KR" dirty="0" err="1"/>
+              <a:t>incre</a:t>
+            </a:r>
+            <a:r>
+              <a:rPr lang="en-US" altLang="ko-KR" dirty="0"/>
+              <a:t> graph</a:t>
+            </a:r>
+            <a:r>
+              <a:rPr lang="ko-KR" altLang="en-US" dirty="0"/>
+              <a:t>가 잘 </a:t>
+            </a:r>
+            <a:r>
+              <a:rPr lang="ko-KR" altLang="en-US" dirty="0" err="1"/>
+              <a:t>퓨전되었다는</a:t>
+            </a:r>
+            <a:r>
+              <a:rPr lang="ko-KR" altLang="en-US" dirty="0"/>
+              <a:t> 것을 검증하고 </a:t>
+            </a:r>
+            <a:r>
+              <a:rPr lang="ko-KR" altLang="en-US" dirty="0" err="1"/>
+              <a:t>다시말하자면</a:t>
+            </a:r>
+            <a:r>
+              <a:rPr lang="ko-KR" altLang="en-US" dirty="0"/>
+              <a:t> </a:t>
+            </a:r>
+            <a:r>
+              <a:rPr lang="en-US" altLang="ko-KR" dirty="0"/>
+              <a:t>IGC, CED</a:t>
+            </a:r>
+            <a:r>
+              <a:rPr lang="ko-KR" altLang="en-US" dirty="0"/>
+              <a:t>가 잘 먹힌다는 것</a:t>
+            </a:r>
+            <a:r>
+              <a:rPr lang="en-US" altLang="ko-KR" dirty="0"/>
+              <a:t>.</a:t>
+            </a:r>
+          </a:p>
+        </p:txBody>
+      </p:sp>
+      <p:sp>
+        <p:nvSpPr>
+          <p:cNvPr id="4" name="슬라이드 번호 개체 틀 3"/>
+          <p:cNvSpPr>
+            <a:spLocks noGrp="1"/>
+          </p:cNvSpPr>
+          <p:nvPr>
+            <p:ph type="sldNum" sz="quarter" idx="5"/>
+          </p:nvPr>
+        </p:nvSpPr>
+        <p:spPr/>
+        <p:txBody>
+          <a:bodyPr/>
+          <a:lstStyle/>
+          <a:p>
+            <a:fld id="{E3508E54-26A4-461A-9177-07CC1B35B5F2}" type="slidenum">
+              <a:rPr lang="ko-KR" altLang="en-US" smtClean="0"/>
+              <a:t>26</a:t>
+            </a:fld>
+            <a:endParaRPr lang="ko-KR" altLang="en-US"/>
+          </a:p>
+        </p:txBody>
+      </p:sp>
+    </p:spTree>
+    <p:extLst>
+      <p:ext uri="{BB962C8B-B14F-4D97-AF65-F5344CB8AC3E}">
+        <p14:creationId xmlns:p14="http://schemas.microsoft.com/office/powerpoint/2010/main" val="941786373"/>
+      </p:ext>
+    </p:extLst>
+  </p:cSld>
+  <p:clrMapOvr>
+    <a:masterClrMapping/>
+  </p:clrMapOvr>
+</p:notes>
+</file>
+
+<file path=ppt/notesSlides/notesSlide26.xml><?xml version="1.0" encoding="utf-8"?>
+<p:notes xmlns:a="http://schemas.openxmlformats.org/drawingml/2006/main" xmlns:r="http://schemas.openxmlformats.org/officeDocument/2006/relationships" xmlns:p="http://schemas.openxmlformats.org/presentationml/2006/main">
+  <p:cSld>
+    <p:spTree>
+      <p:nvGrpSpPr>
+        <p:cNvPr id="1" name=""/>
+        <p:cNvGrpSpPr/>
+        <p:nvPr/>
+      </p:nvGrpSpPr>
+      <p:grpSpPr>
+        <a:xfrm>
+          <a:off x="0" y="0"/>
+          <a:ext cx="0" cy="0"/>
+          <a:chOff x="0" y="0"/>
+          <a:chExt cx="0" cy="0"/>
+        </a:xfrm>
+      </p:grpSpPr>
+      <p:sp>
+        <p:nvSpPr>
+          <p:cNvPr id="2" name="슬라이드 이미지 개체 틀 1"/>
+          <p:cNvSpPr>
+            <a:spLocks noGrp="1" noRot="1" noChangeAspect="1"/>
+          </p:cNvSpPr>
+          <p:nvPr>
+            <p:ph type="sldImg"/>
+          </p:nvPr>
+        </p:nvSpPr>
+        <p:spPr/>
+      </p:sp>
+      <p:sp>
+        <p:nvSpPr>
+          <p:cNvPr id="3" name="슬라이드 노트 개체 틀 2"/>
+          <p:cNvSpPr>
+            <a:spLocks noGrp="1"/>
+          </p:cNvSpPr>
+          <p:nvPr>
+            <p:ph type="body" idx="1"/>
+          </p:nvPr>
+        </p:nvSpPr>
+        <p:spPr/>
+        <p:txBody>
+          <a:bodyPr/>
+          <a:lstStyle/>
+          <a:p>
+            <a:pPr marL="0" indent="0">
+              <a:buNone/>
+            </a:pPr>
+            <a:r>
+              <a:rPr lang="en-US" altLang="ko-KR" dirty="0"/>
+              <a:t>2. stage-wise </a:t>
+            </a:r>
+            <a:r>
+              <a:rPr lang="ko-KR" altLang="en-US" dirty="0" err="1"/>
+              <a:t>포포몬스</a:t>
+            </a:r>
+            <a:endParaRPr lang="en-US" altLang="ko-KR" dirty="0"/>
+          </a:p>
+          <a:p>
+            <a:pPr marL="0" indent="0">
+              <a:buNone/>
+            </a:pPr>
+            <a:r>
+              <a:rPr lang="ko-KR" altLang="en-US" dirty="0"/>
+              <a:t>훈련</a:t>
+            </a:r>
+            <a:r>
+              <a:rPr lang="en-US" altLang="ko-KR" dirty="0"/>
+              <a:t>, </a:t>
+            </a:r>
+            <a:r>
+              <a:rPr lang="ko-KR" altLang="en-US" dirty="0"/>
+              <a:t>검증</a:t>
+            </a:r>
+            <a:r>
+              <a:rPr lang="en-US" altLang="ko-KR" dirty="0"/>
+              <a:t>, </a:t>
+            </a:r>
+            <a:r>
+              <a:rPr lang="ko-KR" altLang="en-US" dirty="0"/>
+              <a:t>테스트를 거치는 모든 단계에서 </a:t>
+            </a:r>
+            <a:r>
+              <a:rPr lang="en-US" altLang="ko-KR" dirty="0"/>
+              <a:t>ci </a:t>
+            </a:r>
+            <a:r>
+              <a:rPr lang="en-US" altLang="ko-KR" dirty="0" err="1"/>
+              <a:t>lightgcn</a:t>
+            </a:r>
+            <a:r>
+              <a:rPr lang="ko-KR" altLang="en-US" dirty="0"/>
+              <a:t>이 우수함</a:t>
+            </a:r>
+            <a:endParaRPr lang="en-US" altLang="ko-KR" dirty="0"/>
+          </a:p>
+          <a:p>
+            <a:pPr marL="0" indent="0">
+              <a:buNone/>
+            </a:pPr>
+            <a:r>
+              <a:rPr lang="en-US" altLang="ko-KR" dirty="0"/>
+              <a:t>3. Speed up</a:t>
+            </a:r>
+          </a:p>
+          <a:p>
+            <a:pPr marL="0" indent="0">
+              <a:buNone/>
+            </a:pPr>
+            <a:r>
+              <a:rPr lang="ko-KR" altLang="en-US" dirty="0"/>
+              <a:t>속도도 </a:t>
+            </a:r>
+            <a:r>
+              <a:rPr lang="ko-KR" altLang="en-US" dirty="0" err="1"/>
+              <a:t>ㅋㅎ</a:t>
+            </a:r>
+            <a:r>
+              <a:rPr lang="ko-KR" altLang="en-US" dirty="0"/>
+              <a:t> 빠름</a:t>
+            </a:r>
+            <a:r>
+              <a:rPr lang="en-US" altLang="ko-KR" dirty="0"/>
+              <a:t>.</a:t>
+            </a:r>
+          </a:p>
+        </p:txBody>
+      </p:sp>
+      <p:sp>
+        <p:nvSpPr>
+          <p:cNvPr id="4" name="슬라이드 번호 개체 틀 3"/>
+          <p:cNvSpPr>
+            <a:spLocks noGrp="1"/>
+          </p:cNvSpPr>
+          <p:nvPr>
+            <p:ph type="sldNum" sz="quarter" idx="5"/>
+          </p:nvPr>
+        </p:nvSpPr>
+        <p:spPr/>
+        <p:txBody>
+          <a:bodyPr/>
+          <a:lstStyle/>
+          <a:p>
+            <a:fld id="{E3508E54-26A4-461A-9177-07CC1B35B5F2}" type="slidenum">
+              <a:rPr lang="ko-KR" altLang="en-US" smtClean="0"/>
+              <a:t>27</a:t>
+            </a:fld>
+            <a:endParaRPr lang="ko-KR" altLang="en-US"/>
+          </a:p>
+        </p:txBody>
+      </p:sp>
+    </p:spTree>
+    <p:extLst>
+      <p:ext uri="{BB962C8B-B14F-4D97-AF65-F5344CB8AC3E}">
+        <p14:creationId xmlns:p14="http://schemas.microsoft.com/office/powerpoint/2010/main" val="4020562574"/>
+      </p:ext>
+    </p:extLst>
+  </p:cSld>
+  <p:clrMapOvr>
+    <a:masterClrMapping/>
+  </p:clrMapOvr>
+</p:notes>
+</file>
+
+<file path=ppt/notesSlides/notesSlide27.xml><?xml version="1.0" encoding="utf-8"?>
+<p:notes xmlns:a="http://schemas.openxmlformats.org/drawingml/2006/main" xmlns:r="http://schemas.openxmlformats.org/officeDocument/2006/relationships" xmlns:p="http://schemas.openxmlformats.org/presentationml/2006/main">
+  <p:cSld>
+    <p:spTree>
+      <p:nvGrpSpPr>
+        <p:cNvPr id="1" name=""/>
+        <p:cNvGrpSpPr/>
+        <p:nvPr/>
+      </p:nvGrpSpPr>
+      <p:grpSpPr>
+        <a:xfrm>
+          <a:off x="0" y="0"/>
+          <a:ext cx="0" cy="0"/>
+          <a:chOff x="0" y="0"/>
+          <a:chExt cx="0" cy="0"/>
+        </a:xfrm>
+      </p:grpSpPr>
+      <p:sp>
+        <p:nvSpPr>
+          <p:cNvPr id="2" name="슬라이드 이미지 개체 틀 1"/>
+          <p:cNvSpPr>
+            <a:spLocks noGrp="1" noRot="1" noChangeAspect="1"/>
+          </p:cNvSpPr>
+          <p:nvPr>
+            <p:ph type="sldImg"/>
+          </p:nvPr>
+        </p:nvSpPr>
+        <p:spPr/>
+      </p:sp>
+      <p:sp>
+        <p:nvSpPr>
+          <p:cNvPr id="3" name="슬라이드 노트 개체 틀 2"/>
+          <p:cNvSpPr>
+            <a:spLocks noGrp="1"/>
+          </p:cNvSpPr>
+          <p:nvPr>
+            <p:ph type="body" idx="1"/>
+          </p:nvPr>
+        </p:nvSpPr>
+        <p:spPr/>
+        <p:txBody>
+          <a:bodyPr/>
+          <a:lstStyle/>
+          <a:p>
+            <a:pPr marL="0" indent="0">
+              <a:buNone/>
+            </a:pPr>
+            <a:r>
+              <a:rPr lang="en-US" altLang="ko-KR" dirty="0"/>
+              <a:t>2. Ablation study</a:t>
+            </a:r>
+          </a:p>
+          <a:p>
+            <a:pPr marL="0" indent="0">
+              <a:buNone/>
+            </a:pPr>
+            <a:r>
+              <a:rPr lang="en-US" altLang="ko-KR" dirty="0"/>
+              <a:t>CED, IGC</a:t>
+            </a:r>
+            <a:r>
+              <a:rPr lang="ko-KR" altLang="en-US" dirty="0"/>
+              <a:t>가 추천 성능에 주는 영향을 평가</a:t>
+            </a:r>
+            <a:endParaRPr lang="en-US" altLang="ko-KR" dirty="0"/>
+          </a:p>
+          <a:p>
+            <a:pPr marL="0" indent="0">
+              <a:buNone/>
+            </a:pPr>
+            <a:endParaRPr lang="en-US" altLang="ko-KR" dirty="0"/>
+          </a:p>
+          <a:p>
+            <a:pPr marL="0" indent="0">
+              <a:buNone/>
+            </a:pPr>
+            <a:r>
+              <a:rPr lang="en-US" altLang="ko-KR" dirty="0"/>
+              <a:t>CI </a:t>
+            </a:r>
+            <a:r>
+              <a:rPr lang="ko-KR" altLang="en-US" dirty="0"/>
+              <a:t>에서 각각 하나씩 </a:t>
+            </a:r>
+            <a:r>
+              <a:rPr lang="ko-KR" altLang="en-US" dirty="0" err="1"/>
+              <a:t>없엔</a:t>
+            </a:r>
+            <a:r>
+              <a:rPr lang="ko-KR" altLang="en-US" dirty="0"/>
+              <a:t> </a:t>
+            </a:r>
+            <a:r>
+              <a:rPr lang="en-US" altLang="ko-KR" dirty="0"/>
+              <a:t>I-</a:t>
+            </a:r>
+            <a:r>
+              <a:rPr lang="en-US" altLang="ko-KR" dirty="0" err="1"/>
+              <a:t>lightgcn</a:t>
+            </a:r>
+            <a:r>
+              <a:rPr lang="en-US" altLang="ko-KR" dirty="0"/>
+              <a:t>, ci-</a:t>
+            </a:r>
+            <a:r>
+              <a:rPr lang="en-US" altLang="ko-KR" dirty="0" err="1"/>
+              <a:t>lightgcn</a:t>
+            </a:r>
+            <a:r>
+              <a:rPr lang="en-US" altLang="ko-KR" dirty="0"/>
+              <a:t>(t)</a:t>
+            </a:r>
+            <a:r>
+              <a:rPr lang="ko-KR" altLang="en-US" dirty="0"/>
+              <a:t>를 가지고 실험을 해봄</a:t>
+            </a:r>
+            <a:r>
+              <a:rPr lang="en-US" altLang="ko-KR" dirty="0"/>
+              <a:t>!</a:t>
+            </a:r>
+          </a:p>
+        </p:txBody>
+      </p:sp>
+      <p:sp>
+        <p:nvSpPr>
+          <p:cNvPr id="4" name="슬라이드 번호 개체 틀 3"/>
+          <p:cNvSpPr>
+            <a:spLocks noGrp="1"/>
+          </p:cNvSpPr>
+          <p:nvPr>
+            <p:ph type="sldNum" sz="quarter" idx="5"/>
+          </p:nvPr>
+        </p:nvSpPr>
+        <p:spPr/>
+        <p:txBody>
+          <a:bodyPr/>
+          <a:lstStyle/>
+          <a:p>
+            <a:fld id="{E3508E54-26A4-461A-9177-07CC1B35B5F2}" type="slidenum">
+              <a:rPr lang="ko-KR" altLang="en-US" smtClean="0"/>
+              <a:t>28</a:t>
+            </a:fld>
+            <a:endParaRPr lang="ko-KR" altLang="en-US"/>
+          </a:p>
+        </p:txBody>
+      </p:sp>
+    </p:spTree>
+    <p:extLst>
+      <p:ext uri="{BB962C8B-B14F-4D97-AF65-F5344CB8AC3E}">
+        <p14:creationId xmlns:p14="http://schemas.microsoft.com/office/powerpoint/2010/main" val="1286964677"/>
+      </p:ext>
+    </p:extLst>
+  </p:cSld>
+  <p:clrMapOvr>
+    <a:masterClrMapping/>
+  </p:clrMapOvr>
+</p:notes>
+</file>
+
+<file path=ppt/notesSlides/notesSlide28.xml><?xml version="1.0" encoding="utf-8"?>
+<p:notes xmlns:a="http://schemas.openxmlformats.org/drawingml/2006/main" xmlns:r="http://schemas.openxmlformats.org/officeDocument/2006/relationships" xmlns:p="http://schemas.openxmlformats.org/presentationml/2006/main">
+  <p:cSld>
+    <p:spTree>
+      <p:nvGrpSpPr>
+        <p:cNvPr id="1" name=""/>
+        <p:cNvGrpSpPr/>
+        <p:nvPr/>
+      </p:nvGrpSpPr>
+      <p:grpSpPr>
+        <a:xfrm>
+          <a:off x="0" y="0"/>
+          <a:ext cx="0" cy="0"/>
+          <a:chOff x="0" y="0"/>
+          <a:chExt cx="0" cy="0"/>
+        </a:xfrm>
+      </p:grpSpPr>
+      <p:sp>
+        <p:nvSpPr>
+          <p:cNvPr id="2" name="슬라이드 이미지 개체 틀 1"/>
+          <p:cNvSpPr>
+            <a:spLocks noGrp="1" noRot="1" noChangeAspect="1"/>
+          </p:cNvSpPr>
+          <p:nvPr>
+            <p:ph type="sldImg"/>
+          </p:nvPr>
+        </p:nvSpPr>
+        <p:spPr/>
+      </p:sp>
+      <p:sp>
+        <p:nvSpPr>
+          <p:cNvPr id="3" name="슬라이드 노트 개체 틀 2"/>
+          <p:cNvSpPr>
+            <a:spLocks noGrp="1"/>
+          </p:cNvSpPr>
+          <p:nvPr>
+            <p:ph type="body" idx="1"/>
+          </p:nvPr>
+        </p:nvSpPr>
+        <p:spPr/>
+        <p:txBody>
+          <a:bodyPr/>
+          <a:lstStyle/>
+          <a:p>
+            <a:r>
+              <a:rPr lang="ko-KR" altLang="en-US" dirty="0"/>
+              <a:t>논문의 핵심은 </a:t>
+            </a:r>
+            <a:r>
+              <a:rPr lang="en-US" altLang="ko-KR" dirty="0"/>
+              <a:t>old graph</a:t>
+            </a:r>
+            <a:r>
+              <a:rPr lang="ko-KR" altLang="en-US" dirty="0"/>
+              <a:t>를 </a:t>
+            </a:r>
+            <a:r>
+              <a:rPr lang="en-US" altLang="ko-KR" dirty="0" err="1"/>
+              <a:t>agg</a:t>
+            </a:r>
+            <a:r>
+              <a:rPr lang="ko-KR" altLang="en-US" dirty="0"/>
+              <a:t>에서 분리하는 동시에</a:t>
+            </a:r>
+            <a:r>
+              <a:rPr lang="en-US" altLang="ko-KR" dirty="0"/>
+              <a:t> long term signa</a:t>
+            </a:r>
+            <a:r>
+              <a:rPr lang="ko-KR" altLang="en-US" dirty="0"/>
+              <a:t>을 보존하고 </a:t>
+            </a:r>
+            <a:r>
+              <a:rPr lang="en-US" altLang="ko-KR" dirty="0"/>
+              <a:t>inactive node</a:t>
+            </a:r>
+            <a:r>
+              <a:rPr lang="ko-KR" altLang="en-US" dirty="0"/>
+              <a:t>를 </a:t>
+            </a:r>
+            <a:r>
+              <a:rPr lang="en-US" altLang="ko-KR" dirty="0"/>
+              <a:t>refresh </a:t>
+            </a:r>
+            <a:r>
+              <a:rPr lang="ko-KR" altLang="en-US" dirty="0"/>
+              <a:t>하는 방법에 있었다</a:t>
+            </a:r>
+            <a:r>
+              <a:rPr lang="en-US" altLang="ko-KR" dirty="0"/>
+              <a:t>.</a:t>
+            </a:r>
+          </a:p>
+        </p:txBody>
+      </p:sp>
+      <p:sp>
+        <p:nvSpPr>
+          <p:cNvPr id="4" name="슬라이드 번호 개체 틀 3"/>
+          <p:cNvSpPr>
+            <a:spLocks noGrp="1"/>
+          </p:cNvSpPr>
+          <p:nvPr>
+            <p:ph type="sldNum" sz="quarter" idx="5"/>
+          </p:nvPr>
+        </p:nvSpPr>
+        <p:spPr/>
+        <p:txBody>
+          <a:bodyPr/>
+          <a:lstStyle/>
+          <a:p>
+            <a:fld id="{E3508E54-26A4-461A-9177-07CC1B35B5F2}" type="slidenum">
+              <a:rPr lang="ko-KR" altLang="en-US" smtClean="0"/>
+              <a:t>29</a:t>
+            </a:fld>
+            <a:endParaRPr lang="ko-KR" altLang="en-US"/>
+          </a:p>
+        </p:txBody>
+      </p:sp>
+    </p:spTree>
+    <p:extLst>
+      <p:ext uri="{BB962C8B-B14F-4D97-AF65-F5344CB8AC3E}">
         <p14:creationId xmlns:p14="http://schemas.microsoft.com/office/powerpoint/2010/main" val="3936829788"/>
+      </p:ext>
+    </p:extLst>
+  </p:cSld>
+  <p:clrMapOvr>
+    <a:masterClrMapping/>
+  </p:clrMapOvr>
+</p:notes>
+</file>
+
+<file path=ppt/notesSlides/notesSlide29.xml><?xml version="1.0" encoding="utf-8"?>
+<p:notes xmlns:a="http://schemas.openxmlformats.org/drawingml/2006/main" xmlns:r="http://schemas.openxmlformats.org/officeDocument/2006/relationships" xmlns:p="http://schemas.openxmlformats.org/presentationml/2006/main">
+  <p:cSld>
+    <p:spTree>
+      <p:nvGrpSpPr>
+        <p:cNvPr id="1" name=""/>
+        <p:cNvGrpSpPr/>
+        <p:nvPr/>
+      </p:nvGrpSpPr>
+      <p:grpSpPr>
+        <a:xfrm>
+          <a:off x="0" y="0"/>
+          <a:ext cx="0" cy="0"/>
+          <a:chOff x="0" y="0"/>
+          <a:chExt cx="0" cy="0"/>
+        </a:xfrm>
+      </p:grpSpPr>
+      <p:sp>
+        <p:nvSpPr>
+          <p:cNvPr id="2" name="슬라이드 이미지 개체 틀 1"/>
+          <p:cNvSpPr>
+            <a:spLocks noGrp="1" noRot="1" noChangeAspect="1"/>
+          </p:cNvSpPr>
+          <p:nvPr>
+            <p:ph type="sldImg"/>
+          </p:nvPr>
+        </p:nvSpPr>
+        <p:spPr/>
+      </p:sp>
+      <p:sp>
+        <p:nvSpPr>
+          <p:cNvPr id="3" name="슬라이드 노트 개체 틀 2"/>
+          <p:cNvSpPr>
+            <a:spLocks noGrp="1"/>
+          </p:cNvSpPr>
+          <p:nvPr>
+            <p:ph type="body" idx="1"/>
+          </p:nvPr>
+        </p:nvSpPr>
+        <p:spPr/>
+        <p:txBody>
+          <a:bodyPr/>
+          <a:lstStyle/>
+          <a:p>
+            <a:endParaRPr lang="en-US" altLang="ko-KR" dirty="0"/>
+          </a:p>
+        </p:txBody>
+      </p:sp>
+      <p:sp>
+        <p:nvSpPr>
+          <p:cNvPr id="4" name="슬라이드 번호 개체 틀 3"/>
+          <p:cNvSpPr>
+            <a:spLocks noGrp="1"/>
+          </p:cNvSpPr>
+          <p:nvPr>
+            <p:ph type="sldNum" sz="quarter" idx="5"/>
+          </p:nvPr>
+        </p:nvSpPr>
+        <p:spPr/>
+        <p:txBody>
+          <a:bodyPr/>
+          <a:lstStyle/>
+          <a:p>
+            <a:fld id="{E3508E54-26A4-461A-9177-07CC1B35B5F2}" type="slidenum">
+              <a:rPr lang="ko-KR" altLang="en-US" smtClean="0"/>
+              <a:t>30</a:t>
+            </a:fld>
+            <a:endParaRPr lang="ko-KR" altLang="en-US"/>
+          </a:p>
+        </p:txBody>
+      </p:sp>
+    </p:spTree>
+    <p:extLst>
+      <p:ext uri="{BB962C8B-B14F-4D97-AF65-F5344CB8AC3E}">
+        <p14:creationId xmlns:p14="http://schemas.microsoft.com/office/powerpoint/2010/main" val="3828741288"/>
       </p:ext>
     </p:extLst>
   </p:cSld>
@@ -10794,8 +11779,8 @@
           </a:p>
         </p:txBody>
       </p:sp>
-      <mc:AlternateContent xmlns:mc="http://schemas.openxmlformats.org/markup-compatibility/2006">
-        <mc:Choice xmlns:a14="http://schemas.microsoft.com/office/drawing/2010/main" Requires="a14">
+      <mc:AlternateContent xmlns:mc="http://schemas.openxmlformats.org/markup-compatibility/2006" xmlns:a14="http://schemas.microsoft.com/office/drawing/2010/main">
+        <mc:Choice Requires="a14">
           <p:sp>
             <p:nvSpPr>
               <p:cNvPr id="5" name="내용 개체 틀 2">
@@ -11417,7 +12402,7 @@
             </p:txBody>
           </p:sp>
         </mc:Choice>
-        <mc:Fallback>
+        <mc:Fallback xmlns="">
           <p:sp>
             <p:nvSpPr>
               <p:cNvPr id="5" name="내용 개체 틀 2">
@@ -11902,8 +12887,8 @@
           </a:p>
         </p:txBody>
       </p:sp>
-      <mc:AlternateContent xmlns:mc="http://schemas.openxmlformats.org/markup-compatibility/2006">
-        <mc:Choice xmlns:a14="http://schemas.microsoft.com/office/drawing/2010/main" Requires="a14">
+      <mc:AlternateContent xmlns:mc="http://schemas.openxmlformats.org/markup-compatibility/2006" xmlns:a14="http://schemas.microsoft.com/office/drawing/2010/main">
+        <mc:Choice Requires="a14">
           <p:sp>
             <p:nvSpPr>
               <p:cNvPr id="5" name="내용 개체 틀 2">
@@ -12559,7 +13544,7 @@
             </p:txBody>
           </p:sp>
         </mc:Choice>
-        <mc:Fallback>
+        <mc:Fallback xmlns="">
           <p:sp>
             <p:nvSpPr>
               <p:cNvPr id="5" name="내용 개체 틀 2">
@@ -12840,8 +13825,8 @@
           </a:p>
         </p:txBody>
       </p:sp>
-      <mc:AlternateContent xmlns:mc="http://schemas.openxmlformats.org/markup-compatibility/2006">
-        <mc:Choice xmlns:a14="http://schemas.microsoft.com/office/drawing/2010/main" Requires="a14">
+      <mc:AlternateContent xmlns:mc="http://schemas.openxmlformats.org/markup-compatibility/2006" xmlns:a14="http://schemas.microsoft.com/office/drawing/2010/main">
+        <mc:Choice Requires="a14">
           <p:sp>
             <p:nvSpPr>
               <p:cNvPr id="5" name="내용 개체 틀 2">
@@ -13405,7 +14390,7 @@
             </p:txBody>
           </p:sp>
         </mc:Choice>
-        <mc:Fallback>
+        <mc:Fallback xmlns="">
           <p:sp>
             <p:nvSpPr>
               <p:cNvPr id="5" name="내용 개체 틀 2">
@@ -13686,8 +14671,8 @@
           </a:p>
         </p:txBody>
       </p:sp>
-      <mc:AlternateContent xmlns:mc="http://schemas.openxmlformats.org/markup-compatibility/2006">
-        <mc:Choice xmlns:a14="http://schemas.microsoft.com/office/drawing/2010/main" Requires="a14">
+      <mc:AlternateContent xmlns:mc="http://schemas.openxmlformats.org/markup-compatibility/2006" xmlns:a14="http://schemas.microsoft.com/office/drawing/2010/main">
+        <mc:Choice Requires="a14">
           <p:sp>
             <p:nvSpPr>
               <p:cNvPr id="5" name="내용 개체 틀 2">
@@ -14195,7 +15180,7 @@
             </p:txBody>
           </p:sp>
         </mc:Choice>
-        <mc:Fallback>
+        <mc:Fallback xmlns="">
           <p:sp>
             <p:nvSpPr>
               <p:cNvPr id="5" name="내용 개체 틀 2">
@@ -16006,8 +16991,8 @@
           </a:p>
         </p:txBody>
       </p:sp>
-      <mc:AlternateContent xmlns:mc="http://schemas.openxmlformats.org/markup-compatibility/2006">
-        <mc:Choice xmlns:a14="http://schemas.microsoft.com/office/drawing/2010/main" Requires="a14">
+      <mc:AlternateContent xmlns:mc="http://schemas.openxmlformats.org/markup-compatibility/2006" xmlns:a14="http://schemas.microsoft.com/office/drawing/2010/main">
+        <mc:Choice Requires="a14">
           <p:sp>
             <p:nvSpPr>
               <p:cNvPr id="5" name="내용 개체 틀 2">
@@ -16744,7 +17729,7 @@
             </p:txBody>
           </p:sp>
         </mc:Choice>
-        <mc:Fallback>
+        <mc:Fallback xmlns="">
           <p:sp>
             <p:nvSpPr>
               <p:cNvPr id="5" name="내용 개체 틀 2">
@@ -17795,8 +18780,8 @@
           </a:p>
         </p:txBody>
       </p:sp>
-      <mc:AlternateContent xmlns:mc="http://schemas.openxmlformats.org/markup-compatibility/2006">
-        <mc:Choice xmlns:a14="http://schemas.microsoft.com/office/drawing/2010/main" Requires="a14">
+      <mc:AlternateContent xmlns:mc="http://schemas.openxmlformats.org/markup-compatibility/2006" xmlns:a14="http://schemas.microsoft.com/office/drawing/2010/main">
+        <mc:Choice Requires="a14">
           <p:sp>
             <p:nvSpPr>
               <p:cNvPr id="5" name="내용 개체 틀 2">
@@ -18166,7 +19151,7 @@
             </p:txBody>
           </p:sp>
         </mc:Choice>
-        <mc:Fallback>
+        <mc:Fallback xmlns="">
           <p:sp>
             <p:nvSpPr>
               <p:cNvPr id="5" name="내용 개체 틀 2">
@@ -19332,7 +20317,7 @@
                 <a:latin typeface="나눔스퀘어 ExtraBold"/>
                 <a:cs typeface="Arial" panose="020B0604020202020204" pitchFamily="34" charset="0"/>
               </a:rPr>
-              <a:t>Introduction</a:t>
+              <a:t>Experiments</a:t>
             </a:r>
             <a:endParaRPr lang="ko-KR" altLang="en-US" sz="3600" b="1" dirty="0">
               <a:solidFill>
@@ -19374,6 +20359,1139 @@
             <a:normAutofit/>
           </a:bodyPr>
           <a:lstStyle/>
+          <a:p>
+            <a:pPr marL="432000" indent="-432000">
+              <a:lnSpc>
+                <a:spcPct val="100000"/>
+              </a:lnSpc>
+              <a:buClr>
+                <a:srgbClr val="004F9E"/>
+              </a:buClr>
+              <a:buFont typeface="Wingdings" panose="05000000000000000000" pitchFamily="2" charset="2"/>
+              <a:buChar char="§"/>
+            </a:pPr>
+            <a:r>
+              <a:rPr lang="en-US" altLang="ko-KR" sz="2000" dirty="0">
+                <a:latin typeface="나눔스퀘어 ExtraBold" panose="020B0600000101010101" pitchFamily="50" charset="-127"/>
+                <a:ea typeface="나눔스퀘어 ExtraBold" panose="020B0600000101010101" pitchFamily="50" charset="-127"/>
+                <a:cs typeface="Arial" panose="020B0604020202020204" pitchFamily="34" charset="0"/>
+              </a:rPr>
+              <a:t>A. Experimental Settings – Datasets</a:t>
+            </a:r>
+          </a:p>
+        </p:txBody>
+      </p:sp>
+      <p:sp>
+        <p:nvSpPr>
+          <p:cNvPr id="4" name="슬라이드 번호 개체 틀 3">
+            <a:extLst>
+              <a:ext uri="{FF2B5EF4-FFF2-40B4-BE49-F238E27FC236}">
+                <a16:creationId xmlns:a16="http://schemas.microsoft.com/office/drawing/2014/main" id="{4705CCFD-CA4E-4794-89D0-C3DF4603C893}"/>
+              </a:ext>
+            </a:extLst>
+          </p:cNvPr>
+          <p:cNvSpPr>
+            <a:spLocks noGrp="1"/>
+          </p:cNvSpPr>
+          <p:nvPr>
+            <p:ph type="sldNum" sz="quarter" idx="12"/>
+          </p:nvPr>
+        </p:nvSpPr>
+        <p:spPr/>
+        <p:txBody>
+          <a:bodyPr/>
+          <a:lstStyle/>
+          <a:p>
+            <a:fld id="{16A93642-25BD-4471-A422-0159119E9512}" type="slidenum">
+              <a:rPr lang="ko-KR" altLang="en-US" smtClean="0"/>
+              <a:pPr/>
+              <a:t>24</a:t>
+            </a:fld>
+            <a:endParaRPr lang="ko-KR" altLang="en-US" dirty="0"/>
+          </a:p>
+        </p:txBody>
+      </p:sp>
+      <p:pic>
+        <p:nvPicPr>
+          <p:cNvPr id="6" name="그림 5">
+            <a:extLst>
+              <a:ext uri="{FF2B5EF4-FFF2-40B4-BE49-F238E27FC236}">
+                <a16:creationId xmlns:a16="http://schemas.microsoft.com/office/drawing/2014/main" id="{85343ACE-677F-D2D3-A905-7A9D34B469AE}"/>
+              </a:ext>
+            </a:extLst>
+          </p:cNvPr>
+          <p:cNvPicPr>
+            <a:picLocks noChangeAspect="1"/>
+          </p:cNvPicPr>
+          <p:nvPr/>
+        </p:nvPicPr>
+        <p:blipFill>
+          <a:blip r:embed="rId3"/>
+          <a:stretch>
+            <a:fillRect/>
+          </a:stretch>
+        </p:blipFill>
+        <p:spPr>
+          <a:xfrm>
+            <a:off x="1995024" y="2698764"/>
+            <a:ext cx="8201951" cy="2468548"/>
+          </a:xfrm>
+          <a:prstGeom prst="rect">
+            <a:avLst/>
+          </a:prstGeom>
+        </p:spPr>
+      </p:pic>
+    </p:spTree>
+    <p:extLst>
+      <p:ext uri="{BB962C8B-B14F-4D97-AF65-F5344CB8AC3E}">
+        <p14:creationId xmlns:p14="http://schemas.microsoft.com/office/powerpoint/2010/main" val="2333312283"/>
+      </p:ext>
+    </p:extLst>
+  </p:cSld>
+  <p:clrMapOvr>
+    <a:masterClrMapping/>
+  </p:clrMapOvr>
+</p:sld>
+</file>
+
+<file path=ppt/slides/slide25.xml><?xml version="1.0" encoding="utf-8"?>
+<p:sld xmlns:a="http://schemas.openxmlformats.org/drawingml/2006/main" xmlns:r="http://schemas.openxmlformats.org/officeDocument/2006/relationships" xmlns:p="http://schemas.openxmlformats.org/presentationml/2006/main">
+  <p:cSld>
+    <p:spTree>
+      <p:nvGrpSpPr>
+        <p:cNvPr id="1" name=""/>
+        <p:cNvGrpSpPr/>
+        <p:nvPr/>
+      </p:nvGrpSpPr>
+      <p:grpSpPr>
+        <a:xfrm>
+          <a:off x="0" y="0"/>
+          <a:ext cx="0" cy="0"/>
+          <a:chOff x="0" y="0"/>
+          <a:chExt cx="0" cy="0"/>
+        </a:xfrm>
+      </p:grpSpPr>
+      <p:sp>
+        <p:nvSpPr>
+          <p:cNvPr id="2" name="제목 1">
+            <a:extLst>
+              <a:ext uri="{FF2B5EF4-FFF2-40B4-BE49-F238E27FC236}">
+                <a16:creationId xmlns:a16="http://schemas.microsoft.com/office/drawing/2014/main" id="{95CB7AEF-6056-404F-8222-D7A0008FE999}"/>
+              </a:ext>
+            </a:extLst>
+          </p:cNvPr>
+          <p:cNvSpPr>
+            <a:spLocks noGrp="1"/>
+          </p:cNvSpPr>
+          <p:nvPr>
+            <p:ph type="title"/>
+          </p:nvPr>
+        </p:nvSpPr>
+        <p:spPr/>
+        <p:txBody>
+          <a:bodyPr>
+            <a:normAutofit/>
+          </a:bodyPr>
+          <a:lstStyle/>
+          <a:p>
+            <a:r>
+              <a:rPr lang="en-US" altLang="ko-KR" sz="3600" b="1" dirty="0">
+                <a:solidFill>
+                  <a:schemeClr val="tx1">
+                    <a:lumMod val="85000"/>
+                    <a:lumOff val="15000"/>
+                  </a:schemeClr>
+                </a:solidFill>
+                <a:latin typeface="나눔스퀘어 ExtraBold"/>
+                <a:cs typeface="Arial" panose="020B0604020202020204" pitchFamily="34" charset="0"/>
+              </a:rPr>
+              <a:t>Experiments</a:t>
+            </a:r>
+            <a:endParaRPr lang="ko-KR" altLang="en-US" sz="3600" b="1" dirty="0">
+              <a:solidFill>
+                <a:schemeClr val="tx1">
+                  <a:lumMod val="85000"/>
+                  <a:lumOff val="15000"/>
+                </a:schemeClr>
+              </a:solidFill>
+              <a:latin typeface="나눔스퀘어 ExtraBold"/>
+              <a:cs typeface="Arial" panose="020B0604020202020204" pitchFamily="34" charset="0"/>
+            </a:endParaRPr>
+          </a:p>
+        </p:txBody>
+      </p:sp>
+      <p:sp>
+        <p:nvSpPr>
+          <p:cNvPr id="3" name="내용 개체 틀 2">
+            <a:extLst>
+              <a:ext uri="{FF2B5EF4-FFF2-40B4-BE49-F238E27FC236}">
+                <a16:creationId xmlns:a16="http://schemas.microsoft.com/office/drawing/2014/main" id="{6F3C4966-F49A-47DB-93D9-018CD3BE693E}"/>
+              </a:ext>
+            </a:extLst>
+          </p:cNvPr>
+          <p:cNvSpPr>
+            <a:spLocks noGrp="1"/>
+          </p:cNvSpPr>
+          <p:nvPr>
+            <p:ph idx="1"/>
+          </p:nvPr>
+        </p:nvSpPr>
+        <p:spPr>
+          <a:xfrm>
+            <a:off x="990600" y="1690688"/>
+            <a:ext cx="10363200" cy="4351338"/>
+          </a:xfrm>
+        </p:spPr>
+        <p:txBody>
+          <a:bodyPr>
+            <a:normAutofit/>
+          </a:bodyPr>
+          <a:lstStyle/>
+          <a:p>
+            <a:pPr marL="432000" indent="-432000">
+              <a:lnSpc>
+                <a:spcPct val="100000"/>
+              </a:lnSpc>
+              <a:buClr>
+                <a:srgbClr val="004F9E"/>
+              </a:buClr>
+              <a:buFont typeface="Wingdings" panose="05000000000000000000" pitchFamily="2" charset="2"/>
+              <a:buChar char="§"/>
+            </a:pPr>
+            <a:r>
+              <a:rPr lang="en-US" altLang="ko-KR" sz="2000" dirty="0">
+                <a:latin typeface="나눔스퀘어 ExtraBold" panose="020B0600000101010101" pitchFamily="50" charset="-127"/>
+                <a:ea typeface="나눔스퀘어 ExtraBold" panose="020B0600000101010101" pitchFamily="50" charset="-127"/>
+                <a:cs typeface="Arial" panose="020B0604020202020204" pitchFamily="34" charset="0"/>
+              </a:rPr>
+              <a:t>A. Experimental Settings – Compared Methods</a:t>
+            </a:r>
+          </a:p>
+        </p:txBody>
+      </p:sp>
+      <p:sp>
+        <p:nvSpPr>
+          <p:cNvPr id="4" name="슬라이드 번호 개체 틀 3">
+            <a:extLst>
+              <a:ext uri="{FF2B5EF4-FFF2-40B4-BE49-F238E27FC236}">
+                <a16:creationId xmlns:a16="http://schemas.microsoft.com/office/drawing/2014/main" id="{4705CCFD-CA4E-4794-89D0-C3DF4603C893}"/>
+              </a:ext>
+            </a:extLst>
+          </p:cNvPr>
+          <p:cNvSpPr>
+            <a:spLocks noGrp="1"/>
+          </p:cNvSpPr>
+          <p:nvPr>
+            <p:ph type="sldNum" sz="quarter" idx="12"/>
+          </p:nvPr>
+        </p:nvSpPr>
+        <p:spPr/>
+        <p:txBody>
+          <a:bodyPr/>
+          <a:lstStyle/>
+          <a:p>
+            <a:fld id="{16A93642-25BD-4471-A422-0159119E9512}" type="slidenum">
+              <a:rPr lang="ko-KR" altLang="en-US" smtClean="0"/>
+              <a:pPr/>
+              <a:t>25</a:t>
+            </a:fld>
+            <a:endParaRPr lang="ko-KR" altLang="en-US" dirty="0"/>
+          </a:p>
+        </p:txBody>
+      </p:sp>
+      <p:pic>
+        <p:nvPicPr>
+          <p:cNvPr id="7" name="그림 6">
+            <a:extLst>
+              <a:ext uri="{FF2B5EF4-FFF2-40B4-BE49-F238E27FC236}">
+                <a16:creationId xmlns:a16="http://schemas.microsoft.com/office/drawing/2014/main" id="{8540B1AE-0347-266E-E9D1-BA4B2563FC54}"/>
+              </a:ext>
+            </a:extLst>
+          </p:cNvPr>
+          <p:cNvPicPr>
+            <a:picLocks noChangeAspect="1"/>
+          </p:cNvPicPr>
+          <p:nvPr/>
+        </p:nvPicPr>
+        <p:blipFill>
+          <a:blip r:embed="rId3"/>
+          <a:stretch>
+            <a:fillRect/>
+          </a:stretch>
+        </p:blipFill>
+        <p:spPr>
+          <a:xfrm>
+            <a:off x="5923344" y="2373405"/>
+            <a:ext cx="3088511" cy="3828466"/>
+          </a:xfrm>
+          <a:prstGeom prst="rect">
+            <a:avLst/>
+          </a:prstGeom>
+        </p:spPr>
+      </p:pic>
+      <p:sp>
+        <p:nvSpPr>
+          <p:cNvPr id="8" name="양쪽 중괄호 7">
+            <a:extLst>
+              <a:ext uri="{FF2B5EF4-FFF2-40B4-BE49-F238E27FC236}">
+                <a16:creationId xmlns:a16="http://schemas.microsoft.com/office/drawing/2014/main" id="{CA5EDBDA-56B4-C4D1-4237-C58E0BF2D9FC}"/>
+              </a:ext>
+            </a:extLst>
+          </p:cNvPr>
+          <p:cNvSpPr/>
+          <p:nvPr/>
+        </p:nvSpPr>
+        <p:spPr>
+          <a:xfrm>
+            <a:off x="5471447" y="4287638"/>
+            <a:ext cx="3992303" cy="1502096"/>
+          </a:xfrm>
+          <a:prstGeom prst="bracePair">
+            <a:avLst/>
+          </a:prstGeom>
+          <a:ln w="38100"/>
+        </p:spPr>
+        <p:style>
+          <a:lnRef idx="1">
+            <a:schemeClr val="accent1"/>
+          </a:lnRef>
+          <a:fillRef idx="0">
+            <a:schemeClr val="accent1"/>
+          </a:fillRef>
+          <a:effectRef idx="0">
+            <a:schemeClr val="accent1"/>
+          </a:effectRef>
+          <a:fontRef idx="minor">
+            <a:schemeClr val="tx1"/>
+          </a:fontRef>
+        </p:style>
+        <p:txBody>
+          <a:bodyPr rtlCol="0" anchor="ctr"/>
+          <a:lstStyle/>
+          <a:p>
+            <a:pPr algn="ctr"/>
+            <a:endParaRPr lang="ko-KR" altLang="en-US"/>
+          </a:p>
+        </p:txBody>
+      </p:sp>
+      <p:sp>
+        <p:nvSpPr>
+          <p:cNvPr id="9" name="TextBox 8">
+            <a:extLst>
+              <a:ext uri="{FF2B5EF4-FFF2-40B4-BE49-F238E27FC236}">
+                <a16:creationId xmlns:a16="http://schemas.microsoft.com/office/drawing/2014/main" id="{A11B4C07-B2F7-A884-B05A-52A4717F6AC0}"/>
+              </a:ext>
+            </a:extLst>
+          </p:cNvPr>
+          <p:cNvSpPr txBox="1"/>
+          <p:nvPr/>
+        </p:nvSpPr>
+        <p:spPr>
+          <a:xfrm>
+            <a:off x="1931041" y="4854020"/>
+            <a:ext cx="3992303" cy="369332"/>
+          </a:xfrm>
+          <a:prstGeom prst="rect">
+            <a:avLst/>
+          </a:prstGeom>
+          <a:noFill/>
+        </p:spPr>
+        <p:txBody>
+          <a:bodyPr wrap="square" rtlCol="0">
+            <a:spAutoFit/>
+          </a:bodyPr>
+          <a:lstStyle/>
+          <a:p>
+            <a:r>
+              <a:rPr lang="en-US" altLang="ko-KR" b="1" dirty="0">
+                <a:solidFill>
+                  <a:schemeClr val="accent1"/>
+                </a:solidFill>
+              </a:rPr>
+              <a:t>Different retraining methods</a:t>
+            </a:r>
+            <a:endParaRPr lang="ko-KR" altLang="en-US" b="1" dirty="0">
+              <a:solidFill>
+                <a:schemeClr val="accent1"/>
+              </a:solidFill>
+            </a:endParaRPr>
+          </a:p>
+        </p:txBody>
+      </p:sp>
+      <p:sp>
+        <p:nvSpPr>
+          <p:cNvPr id="10" name="양쪽 중괄호 9">
+            <a:extLst>
+              <a:ext uri="{FF2B5EF4-FFF2-40B4-BE49-F238E27FC236}">
+                <a16:creationId xmlns:a16="http://schemas.microsoft.com/office/drawing/2014/main" id="{5094A905-31B3-38BB-734C-227B1CC1C438}"/>
+              </a:ext>
+            </a:extLst>
+          </p:cNvPr>
+          <p:cNvSpPr/>
+          <p:nvPr/>
+        </p:nvSpPr>
+        <p:spPr>
+          <a:xfrm>
+            <a:off x="5471446" y="3181341"/>
+            <a:ext cx="3992303" cy="1023025"/>
+          </a:xfrm>
+          <a:prstGeom prst="bracePair">
+            <a:avLst/>
+          </a:prstGeom>
+          <a:ln w="38100"/>
+        </p:spPr>
+        <p:style>
+          <a:lnRef idx="1">
+            <a:schemeClr val="accent1"/>
+          </a:lnRef>
+          <a:fillRef idx="0">
+            <a:schemeClr val="accent1"/>
+          </a:fillRef>
+          <a:effectRef idx="0">
+            <a:schemeClr val="accent1"/>
+          </a:effectRef>
+          <a:fontRef idx="minor">
+            <a:schemeClr val="tx1"/>
+          </a:fontRef>
+        </p:style>
+        <p:txBody>
+          <a:bodyPr rtlCol="0" anchor="ctr"/>
+          <a:lstStyle/>
+          <a:p>
+            <a:pPr algn="ctr"/>
+            <a:endParaRPr lang="ko-KR" altLang="en-US"/>
+          </a:p>
+        </p:txBody>
+      </p:sp>
+      <p:sp>
+        <p:nvSpPr>
+          <p:cNvPr id="11" name="TextBox 10">
+            <a:extLst>
+              <a:ext uri="{FF2B5EF4-FFF2-40B4-BE49-F238E27FC236}">
+                <a16:creationId xmlns:a16="http://schemas.microsoft.com/office/drawing/2014/main" id="{0DC9A8EE-7CE2-B798-19A6-717CE8FECD16}"/>
+              </a:ext>
+            </a:extLst>
+          </p:cNvPr>
+          <p:cNvSpPr txBox="1"/>
+          <p:nvPr/>
+        </p:nvSpPr>
+        <p:spPr>
+          <a:xfrm>
+            <a:off x="1931041" y="3450449"/>
+            <a:ext cx="3992303" cy="369332"/>
+          </a:xfrm>
+          <a:prstGeom prst="rect">
+            <a:avLst/>
+          </a:prstGeom>
+          <a:noFill/>
+        </p:spPr>
+        <p:txBody>
+          <a:bodyPr wrap="square" rtlCol="0">
+            <a:spAutoFit/>
+          </a:bodyPr>
+          <a:lstStyle/>
+          <a:p>
+            <a:r>
+              <a:rPr lang="en-US" altLang="ko-KR" b="1" dirty="0">
+                <a:solidFill>
+                  <a:schemeClr val="accent1"/>
+                </a:solidFill>
+              </a:rPr>
+              <a:t>Sequential recommendation</a:t>
+            </a:r>
+            <a:endParaRPr lang="ko-KR" altLang="en-US" b="1" dirty="0">
+              <a:solidFill>
+                <a:schemeClr val="accent1"/>
+              </a:solidFill>
+            </a:endParaRPr>
+          </a:p>
+        </p:txBody>
+      </p:sp>
+    </p:spTree>
+    <p:extLst>
+      <p:ext uri="{BB962C8B-B14F-4D97-AF65-F5344CB8AC3E}">
+        <p14:creationId xmlns:p14="http://schemas.microsoft.com/office/powerpoint/2010/main" val="4123302329"/>
+      </p:ext>
+    </p:extLst>
+  </p:cSld>
+  <p:clrMapOvr>
+    <a:masterClrMapping/>
+  </p:clrMapOvr>
+</p:sld>
+</file>
+
+<file path=ppt/slides/slide26.xml><?xml version="1.0" encoding="utf-8"?>
+<p:sld xmlns:a="http://schemas.openxmlformats.org/drawingml/2006/main" xmlns:r="http://schemas.openxmlformats.org/officeDocument/2006/relationships" xmlns:p="http://schemas.openxmlformats.org/presentationml/2006/main">
+  <p:cSld>
+    <p:spTree>
+      <p:nvGrpSpPr>
+        <p:cNvPr id="1" name=""/>
+        <p:cNvGrpSpPr/>
+        <p:nvPr/>
+      </p:nvGrpSpPr>
+      <p:grpSpPr>
+        <a:xfrm>
+          <a:off x="0" y="0"/>
+          <a:ext cx="0" cy="0"/>
+          <a:chOff x="0" y="0"/>
+          <a:chExt cx="0" cy="0"/>
+        </a:xfrm>
+      </p:grpSpPr>
+      <p:sp>
+        <p:nvSpPr>
+          <p:cNvPr id="2" name="제목 1">
+            <a:extLst>
+              <a:ext uri="{FF2B5EF4-FFF2-40B4-BE49-F238E27FC236}">
+                <a16:creationId xmlns:a16="http://schemas.microsoft.com/office/drawing/2014/main" id="{95CB7AEF-6056-404F-8222-D7A0008FE999}"/>
+              </a:ext>
+            </a:extLst>
+          </p:cNvPr>
+          <p:cNvSpPr>
+            <a:spLocks noGrp="1"/>
+          </p:cNvSpPr>
+          <p:nvPr>
+            <p:ph type="title"/>
+          </p:nvPr>
+        </p:nvSpPr>
+        <p:spPr/>
+        <p:txBody>
+          <a:bodyPr>
+            <a:normAutofit/>
+          </a:bodyPr>
+          <a:lstStyle/>
+          <a:p>
+            <a:r>
+              <a:rPr lang="en-US" altLang="ko-KR" sz="3600" b="1" dirty="0">
+                <a:solidFill>
+                  <a:schemeClr val="tx1">
+                    <a:lumMod val="85000"/>
+                    <a:lumOff val="15000"/>
+                  </a:schemeClr>
+                </a:solidFill>
+                <a:latin typeface="나눔스퀘어 ExtraBold"/>
+                <a:cs typeface="Arial" panose="020B0604020202020204" pitchFamily="34" charset="0"/>
+              </a:rPr>
+              <a:t>Experiments</a:t>
+            </a:r>
+            <a:endParaRPr lang="ko-KR" altLang="en-US" sz="3600" b="1" dirty="0">
+              <a:solidFill>
+                <a:schemeClr val="tx1">
+                  <a:lumMod val="85000"/>
+                  <a:lumOff val="15000"/>
+                </a:schemeClr>
+              </a:solidFill>
+              <a:latin typeface="나눔스퀘어 ExtraBold"/>
+              <a:cs typeface="Arial" panose="020B0604020202020204" pitchFamily="34" charset="0"/>
+            </a:endParaRPr>
+          </a:p>
+        </p:txBody>
+      </p:sp>
+      <mc:AlternateContent xmlns:mc="http://schemas.openxmlformats.org/markup-compatibility/2006">
+        <mc:Choice xmlns:a14="http://schemas.microsoft.com/office/drawing/2010/main" Requires="a14">
+          <p:sp>
+            <p:nvSpPr>
+              <p:cNvPr id="3" name="내용 개체 틀 2">
+                <a:extLst>
+                  <a:ext uri="{FF2B5EF4-FFF2-40B4-BE49-F238E27FC236}">
+                    <a16:creationId xmlns:a16="http://schemas.microsoft.com/office/drawing/2014/main" id="{6F3C4966-F49A-47DB-93D9-018CD3BE693E}"/>
+                  </a:ext>
+                </a:extLst>
+              </p:cNvPr>
+              <p:cNvSpPr>
+                <a:spLocks noGrp="1"/>
+              </p:cNvSpPr>
+              <p:nvPr>
+                <p:ph idx="1"/>
+              </p:nvPr>
+            </p:nvSpPr>
+            <p:spPr>
+              <a:xfrm>
+                <a:off x="990600" y="1690688"/>
+                <a:ext cx="10363200" cy="4351338"/>
+              </a:xfrm>
+            </p:spPr>
+            <p:txBody>
+              <a:bodyPr>
+                <a:normAutofit/>
+              </a:bodyPr>
+              <a:lstStyle/>
+              <a:p>
+                <a:pPr marL="432000" indent="-432000">
+                  <a:lnSpc>
+                    <a:spcPct val="100000"/>
+                  </a:lnSpc>
+                  <a:buClr>
+                    <a:srgbClr val="004F9E"/>
+                  </a:buClr>
+                  <a:buFont typeface="Wingdings" panose="05000000000000000000" pitchFamily="2" charset="2"/>
+                  <a:buChar char="§"/>
+                </a:pPr>
+                <a:r>
+                  <a:rPr lang="en-US" altLang="ko-KR" sz="2000" dirty="0">
+                    <a:latin typeface="나눔스퀘어 ExtraBold" panose="020B0600000101010101" pitchFamily="50" charset="-127"/>
+                    <a:ea typeface="나눔스퀘어 ExtraBold" panose="020B0600000101010101" pitchFamily="50" charset="-127"/>
+                    <a:cs typeface="Arial" panose="020B0604020202020204" pitchFamily="34" charset="0"/>
+                  </a:rPr>
+                  <a:t>B.</a:t>
+                </a:r>
+                <a:r>
+                  <a:rPr lang="ko-KR" altLang="en-US" sz="2000" dirty="0">
+                    <a:latin typeface="나눔스퀘어 ExtraBold" panose="020B0600000101010101" pitchFamily="50" charset="-127"/>
+                    <a:ea typeface="나눔스퀘어 ExtraBold" panose="020B0600000101010101" pitchFamily="50" charset="-127"/>
+                    <a:cs typeface="Arial" panose="020B0604020202020204" pitchFamily="34" charset="0"/>
+                  </a:rPr>
+                  <a:t> </a:t>
+                </a:r>
+                <a:r>
+                  <a:rPr lang="en-US" altLang="ko-KR" sz="2000" dirty="0">
+                    <a:latin typeface="나눔스퀘어 ExtraBold" panose="020B0600000101010101" pitchFamily="50" charset="-127"/>
+                    <a:ea typeface="나눔스퀘어 ExtraBold" panose="020B0600000101010101" pitchFamily="50" charset="-127"/>
+                    <a:cs typeface="Arial" panose="020B0604020202020204" pitchFamily="34" charset="0"/>
+                  </a:rPr>
+                  <a:t>Performance</a:t>
+                </a:r>
+                <a:r>
+                  <a:rPr lang="ko-KR" altLang="en-US" sz="2000" dirty="0">
+                    <a:latin typeface="나눔스퀘어 ExtraBold" panose="020B0600000101010101" pitchFamily="50" charset="-127"/>
+                    <a:ea typeface="나눔스퀘어 ExtraBold" panose="020B0600000101010101" pitchFamily="50" charset="-127"/>
+                    <a:cs typeface="Arial" panose="020B0604020202020204" pitchFamily="34" charset="0"/>
+                  </a:rPr>
+                  <a:t> </a:t>
+                </a:r>
+                <a:r>
+                  <a:rPr lang="en-US" altLang="ko-KR" sz="2000" dirty="0">
+                    <a:latin typeface="나눔스퀘어 ExtraBold" panose="020B0600000101010101" pitchFamily="50" charset="-127"/>
+                    <a:ea typeface="나눔스퀘어 ExtraBold" panose="020B0600000101010101" pitchFamily="50" charset="-127"/>
+                    <a:cs typeface="Arial" panose="020B0604020202020204" pitchFamily="34" charset="0"/>
+                  </a:rPr>
+                  <a:t>Comparison</a:t>
+                </a:r>
+              </a:p>
+              <a:p>
+                <a:pPr marL="889200" lvl="1" indent="-432000">
+                  <a:lnSpc>
+                    <a:spcPct val="100000"/>
+                  </a:lnSpc>
+                  <a:buClr>
+                    <a:srgbClr val="004F9E"/>
+                  </a:buClr>
+                  <a:buFont typeface="Wingdings" panose="05000000000000000000" pitchFamily="2" charset="2"/>
+                  <a:buChar char="§"/>
+                </a:pPr>
+                <a:r>
+                  <a:rPr lang="en-US" altLang="ko-KR" sz="1600" dirty="0">
+                    <a:latin typeface="나눔스퀘어 ExtraBold" panose="020B0600000101010101" pitchFamily="50" charset="-127"/>
+                    <a:ea typeface="나눔스퀘어 ExtraBold" panose="020B0600000101010101" pitchFamily="50" charset="-127"/>
+                    <a:cs typeface="Arial" panose="020B0604020202020204" pitchFamily="34" charset="0"/>
+                  </a:rPr>
+                  <a:t>RQ1: How is the performance of CI-</a:t>
+                </a:r>
+                <a:r>
+                  <a:rPr lang="en-US" altLang="ko-KR" sz="1600" dirty="0" err="1">
+                    <a:latin typeface="나눔스퀘어 ExtraBold" panose="020B0600000101010101" pitchFamily="50" charset="-127"/>
+                    <a:ea typeface="나눔스퀘어 ExtraBold" panose="020B0600000101010101" pitchFamily="50" charset="-127"/>
+                    <a:cs typeface="Arial" panose="020B0604020202020204" pitchFamily="34" charset="0"/>
+                  </a:rPr>
+                  <a:t>LightGCN</a:t>
+                </a:r>
+                <a:r>
+                  <a:rPr lang="en-US" altLang="ko-KR" sz="1600" dirty="0">
+                    <a:latin typeface="나눔스퀘어 ExtraBold" panose="020B0600000101010101" pitchFamily="50" charset="-127"/>
+                    <a:ea typeface="나눔스퀘어 ExtraBold" panose="020B0600000101010101" pitchFamily="50" charset="-127"/>
+                    <a:cs typeface="Arial" panose="020B0604020202020204" pitchFamily="34" charset="0"/>
+                  </a:rPr>
+                  <a:t> compared with the existing retraining methods?</a:t>
+                </a:r>
+              </a:p>
+              <a:p>
+                <a:pPr marL="889200" lvl="1" indent="-432000">
+                  <a:lnSpc>
+                    <a:spcPct val="100000"/>
+                  </a:lnSpc>
+                  <a:buClr>
+                    <a:srgbClr val="004F9E"/>
+                  </a:buClr>
+                  <a:buFont typeface="Wingdings" panose="05000000000000000000" pitchFamily="2" charset="2"/>
+                  <a:buChar char="§"/>
+                </a:pPr>
+                <a14:m>
+                  <m:oMath xmlns:m="http://schemas.openxmlformats.org/officeDocument/2006/math">
+                    <m:r>
+                      <a:rPr lang="en-US" altLang="ko-KR" sz="1600" b="1" i="1" dirty="0" smtClean="0">
+                        <a:latin typeface="Cambria Math" panose="02040503050406030204" pitchFamily="18" charset="0"/>
+                        <a:ea typeface="나눔스퀘어 ExtraBold" panose="020B0600000101010101" pitchFamily="50" charset="-127"/>
+                        <a:cs typeface="Arial" panose="020B0604020202020204" pitchFamily="34" charset="0"/>
+                      </a:rPr>
+                      <m:t>𝑹𝑰</m:t>
+                    </m:r>
+                  </m:oMath>
+                </a14:m>
+                <a:r>
+                  <a:rPr lang="en-US" altLang="ko-KR" sz="1600" dirty="0">
+                    <a:latin typeface="나눔스퀘어 ExtraBold" panose="020B0600000101010101" pitchFamily="50" charset="-127"/>
+                    <a:ea typeface="나눔스퀘어 ExtraBold" panose="020B0600000101010101" pitchFamily="50" charset="-127"/>
+                    <a:cs typeface="Arial" panose="020B0604020202020204" pitchFamily="34" charset="0"/>
+                  </a:rPr>
+                  <a:t> DENOTES CI-LIGHTGCN’S RELATIVE PERFORMANCE GAIN </a:t>
+                </a:r>
+                <a:r>
+                  <a:rPr lang="en-US" altLang="ko-KR" sz="1600" dirty="0" err="1">
+                    <a:latin typeface="나눔스퀘어 ExtraBold" panose="020B0600000101010101" pitchFamily="50" charset="-127"/>
+                    <a:ea typeface="나눔스퀘어 ExtraBold" panose="020B0600000101010101" pitchFamily="50" charset="-127"/>
+                    <a:cs typeface="Arial" panose="020B0604020202020204" pitchFamily="34" charset="0"/>
+                  </a:rPr>
+                  <a:t>w.r.t.</a:t>
+                </a:r>
+                <a:r>
+                  <a:rPr lang="en-US" altLang="ko-KR" sz="1600" dirty="0">
+                    <a:latin typeface="나눔스퀘어 ExtraBold" panose="020B0600000101010101" pitchFamily="50" charset="-127"/>
+                    <a:ea typeface="나눔스퀘어 ExtraBold" panose="020B0600000101010101" pitchFamily="50" charset="-127"/>
+                    <a:cs typeface="Arial" panose="020B0604020202020204" pitchFamily="34" charset="0"/>
+                  </a:rPr>
+                  <a:t> R@5</a:t>
+                </a:r>
+              </a:p>
+              <a:p>
+                <a:pPr marL="889200" lvl="1" indent="-432000">
+                  <a:lnSpc>
+                    <a:spcPct val="100000"/>
+                  </a:lnSpc>
+                  <a:buClr>
+                    <a:srgbClr val="004F9E"/>
+                  </a:buClr>
+                  <a:buFont typeface="Wingdings" panose="05000000000000000000" pitchFamily="2" charset="2"/>
+                  <a:buChar char="§"/>
+                </a:pPr>
+                <a:endParaRPr lang="en-US" altLang="ko-KR" sz="1600" dirty="0">
+                  <a:latin typeface="나눔스퀘어 ExtraBold" panose="020B0600000101010101" pitchFamily="50" charset="-127"/>
+                  <a:ea typeface="나눔스퀘어 ExtraBold" panose="020B0600000101010101" pitchFamily="50" charset="-127"/>
+                  <a:cs typeface="Arial" panose="020B0604020202020204" pitchFamily="34" charset="0"/>
+                </a:endParaRPr>
+              </a:p>
+              <a:p>
+                <a:pPr marL="432000" indent="-432000">
+                  <a:lnSpc>
+                    <a:spcPct val="100000"/>
+                  </a:lnSpc>
+                  <a:buClr>
+                    <a:srgbClr val="004F9E"/>
+                  </a:buClr>
+                  <a:buFont typeface="Wingdings" panose="05000000000000000000" pitchFamily="2" charset="2"/>
+                  <a:buChar char="§"/>
+                </a:pPr>
+                <a:endParaRPr lang="en-US" altLang="ko-KR" sz="2000" dirty="0">
+                  <a:latin typeface="나눔스퀘어 ExtraBold" panose="020B0600000101010101" pitchFamily="50" charset="-127"/>
+                  <a:ea typeface="나눔스퀘어 ExtraBold" panose="020B0600000101010101" pitchFamily="50" charset="-127"/>
+                  <a:cs typeface="Arial" panose="020B0604020202020204" pitchFamily="34" charset="0"/>
+                </a:endParaRPr>
+              </a:p>
+            </p:txBody>
+          </p:sp>
+        </mc:Choice>
+        <mc:Fallback>
+          <p:sp>
+            <p:nvSpPr>
+              <p:cNvPr id="3" name="내용 개체 틀 2">
+                <a:extLst>
+                  <a:ext uri="{FF2B5EF4-FFF2-40B4-BE49-F238E27FC236}">
+                    <a16:creationId xmlns:a16="http://schemas.microsoft.com/office/drawing/2014/main" id="{6F3C4966-F49A-47DB-93D9-018CD3BE693E}"/>
+                  </a:ext>
+                </a:extLst>
+              </p:cNvPr>
+              <p:cNvSpPr>
+                <a:spLocks noGrp="1" noRot="1" noChangeAspect="1" noMove="1" noResize="1" noEditPoints="1" noAdjustHandles="1" noChangeArrowheads="1" noChangeShapeType="1" noTextEdit="1"/>
+              </p:cNvSpPr>
+              <p:nvPr>
+                <p:ph idx="1"/>
+              </p:nvPr>
+            </p:nvSpPr>
+            <p:spPr>
+              <a:xfrm>
+                <a:off x="990600" y="1690688"/>
+                <a:ext cx="10363200" cy="4351338"/>
+              </a:xfrm>
+              <a:blipFill>
+                <a:blip r:embed="rId3"/>
+                <a:stretch>
+                  <a:fillRect l="-529" t="-700"/>
+                </a:stretch>
+              </a:blipFill>
+            </p:spPr>
+            <p:txBody>
+              <a:bodyPr/>
+              <a:lstStyle/>
+              <a:p>
+                <a:r>
+                  <a:rPr lang="ko-KR" altLang="en-US">
+                    <a:noFill/>
+                  </a:rPr>
+                  <a:t> </a:t>
+                </a:r>
+              </a:p>
+            </p:txBody>
+          </p:sp>
+        </mc:Fallback>
+      </mc:AlternateContent>
+      <p:sp>
+        <p:nvSpPr>
+          <p:cNvPr id="4" name="슬라이드 번호 개체 틀 3">
+            <a:extLst>
+              <a:ext uri="{FF2B5EF4-FFF2-40B4-BE49-F238E27FC236}">
+                <a16:creationId xmlns:a16="http://schemas.microsoft.com/office/drawing/2014/main" id="{4705CCFD-CA4E-4794-89D0-C3DF4603C893}"/>
+              </a:ext>
+            </a:extLst>
+          </p:cNvPr>
+          <p:cNvSpPr>
+            <a:spLocks noGrp="1"/>
+          </p:cNvSpPr>
+          <p:nvPr>
+            <p:ph type="sldNum" sz="quarter" idx="12"/>
+          </p:nvPr>
+        </p:nvSpPr>
+        <p:spPr/>
+        <p:txBody>
+          <a:bodyPr/>
+          <a:lstStyle/>
+          <a:p>
+            <a:fld id="{16A93642-25BD-4471-A422-0159119E9512}" type="slidenum">
+              <a:rPr lang="ko-KR" altLang="en-US" smtClean="0"/>
+              <a:pPr/>
+              <a:t>26</a:t>
+            </a:fld>
+            <a:endParaRPr lang="ko-KR" altLang="en-US" dirty="0"/>
+          </a:p>
+        </p:txBody>
+      </p:sp>
+      <p:pic>
+        <p:nvPicPr>
+          <p:cNvPr id="6" name="그림 5">
+            <a:extLst>
+              <a:ext uri="{FF2B5EF4-FFF2-40B4-BE49-F238E27FC236}">
+                <a16:creationId xmlns:a16="http://schemas.microsoft.com/office/drawing/2014/main" id="{842DF19B-22EA-2DEE-271D-11ED000E2484}"/>
+              </a:ext>
+            </a:extLst>
+          </p:cNvPr>
+          <p:cNvPicPr>
+            <a:picLocks noChangeAspect="1"/>
+          </p:cNvPicPr>
+          <p:nvPr/>
+        </p:nvPicPr>
+        <p:blipFill>
+          <a:blip r:embed="rId4"/>
+          <a:stretch>
+            <a:fillRect/>
+          </a:stretch>
+        </p:blipFill>
+        <p:spPr>
+          <a:xfrm>
+            <a:off x="2639108" y="3016251"/>
+            <a:ext cx="8322118" cy="2351903"/>
+          </a:xfrm>
+          <a:prstGeom prst="rect">
+            <a:avLst/>
+          </a:prstGeom>
+        </p:spPr>
+      </p:pic>
+      <p:sp>
+        <p:nvSpPr>
+          <p:cNvPr id="14" name="양쪽 중괄호 13">
+            <a:extLst>
+              <a:ext uri="{FF2B5EF4-FFF2-40B4-BE49-F238E27FC236}">
+                <a16:creationId xmlns:a16="http://schemas.microsoft.com/office/drawing/2014/main" id="{483D8B86-C628-A35E-EA84-4DF563A63F16}"/>
+              </a:ext>
+            </a:extLst>
+          </p:cNvPr>
+          <p:cNvSpPr/>
+          <p:nvPr/>
+        </p:nvSpPr>
+        <p:spPr>
+          <a:xfrm>
+            <a:off x="2429719" y="4202994"/>
+            <a:ext cx="8924081" cy="964318"/>
+          </a:xfrm>
+          <a:prstGeom prst="bracePair">
+            <a:avLst/>
+          </a:prstGeom>
+          <a:ln w="38100"/>
+        </p:spPr>
+        <p:style>
+          <a:lnRef idx="1">
+            <a:schemeClr val="accent1"/>
+          </a:lnRef>
+          <a:fillRef idx="0">
+            <a:schemeClr val="accent1"/>
+          </a:fillRef>
+          <a:effectRef idx="0">
+            <a:schemeClr val="accent1"/>
+          </a:effectRef>
+          <a:fontRef idx="minor">
+            <a:schemeClr val="tx1"/>
+          </a:fontRef>
+        </p:style>
+        <p:txBody>
+          <a:bodyPr rtlCol="0" anchor="ctr"/>
+          <a:lstStyle/>
+          <a:p>
+            <a:pPr algn="ctr"/>
+            <a:endParaRPr lang="ko-KR" altLang="en-US" b="1" dirty="0"/>
+          </a:p>
+        </p:txBody>
+      </p:sp>
+      <p:sp>
+        <p:nvSpPr>
+          <p:cNvPr id="15" name="TextBox 14">
+            <a:extLst>
+              <a:ext uri="{FF2B5EF4-FFF2-40B4-BE49-F238E27FC236}">
+                <a16:creationId xmlns:a16="http://schemas.microsoft.com/office/drawing/2014/main" id="{D80EF9FE-07CB-16BE-63A3-A80181FC24A4}"/>
+              </a:ext>
+            </a:extLst>
+          </p:cNvPr>
+          <p:cNvSpPr txBox="1"/>
+          <p:nvPr/>
+        </p:nvSpPr>
+        <p:spPr>
+          <a:xfrm>
+            <a:off x="195321" y="4545886"/>
+            <a:ext cx="2709925" cy="276999"/>
+          </a:xfrm>
+          <a:prstGeom prst="rect">
+            <a:avLst/>
+          </a:prstGeom>
+          <a:noFill/>
+        </p:spPr>
+        <p:txBody>
+          <a:bodyPr wrap="square" rtlCol="0">
+            <a:spAutoFit/>
+          </a:bodyPr>
+          <a:lstStyle/>
+          <a:p>
+            <a:r>
+              <a:rPr lang="en-US" altLang="ko-KR" sz="1200" b="1" dirty="0">
+                <a:solidFill>
+                  <a:schemeClr val="accent1"/>
+                </a:solidFill>
+              </a:rPr>
+              <a:t>Different retraining methods</a:t>
+            </a:r>
+            <a:endParaRPr lang="ko-KR" altLang="en-US" sz="1200" b="1" dirty="0">
+              <a:solidFill>
+                <a:schemeClr val="accent1"/>
+              </a:solidFill>
+            </a:endParaRPr>
+          </a:p>
+        </p:txBody>
+      </p:sp>
+    </p:spTree>
+    <p:extLst>
+      <p:ext uri="{BB962C8B-B14F-4D97-AF65-F5344CB8AC3E}">
+        <p14:creationId xmlns:p14="http://schemas.microsoft.com/office/powerpoint/2010/main" val="192649319"/>
+      </p:ext>
+    </p:extLst>
+  </p:cSld>
+  <p:clrMapOvr>
+    <a:masterClrMapping/>
+  </p:clrMapOvr>
+</p:sld>
+</file>
+
+<file path=ppt/slides/slide27.xml><?xml version="1.0" encoding="utf-8"?>
+<p:sld xmlns:a="http://schemas.openxmlformats.org/drawingml/2006/main" xmlns:r="http://schemas.openxmlformats.org/officeDocument/2006/relationships" xmlns:p="http://schemas.openxmlformats.org/presentationml/2006/main">
+  <p:cSld>
+    <p:spTree>
+      <p:nvGrpSpPr>
+        <p:cNvPr id="1" name=""/>
+        <p:cNvGrpSpPr/>
+        <p:nvPr/>
+      </p:nvGrpSpPr>
+      <p:grpSpPr>
+        <a:xfrm>
+          <a:off x="0" y="0"/>
+          <a:ext cx="0" cy="0"/>
+          <a:chOff x="0" y="0"/>
+          <a:chExt cx="0" cy="0"/>
+        </a:xfrm>
+      </p:grpSpPr>
+      <p:sp>
+        <p:nvSpPr>
+          <p:cNvPr id="2" name="제목 1">
+            <a:extLst>
+              <a:ext uri="{FF2B5EF4-FFF2-40B4-BE49-F238E27FC236}">
+                <a16:creationId xmlns:a16="http://schemas.microsoft.com/office/drawing/2014/main" id="{95CB7AEF-6056-404F-8222-D7A0008FE999}"/>
+              </a:ext>
+            </a:extLst>
+          </p:cNvPr>
+          <p:cNvSpPr>
+            <a:spLocks noGrp="1"/>
+          </p:cNvSpPr>
+          <p:nvPr>
+            <p:ph type="title"/>
+          </p:nvPr>
+        </p:nvSpPr>
+        <p:spPr/>
+        <p:txBody>
+          <a:bodyPr>
+            <a:normAutofit/>
+          </a:bodyPr>
+          <a:lstStyle/>
+          <a:p>
+            <a:r>
+              <a:rPr lang="en-US" altLang="ko-KR" sz="3600" b="1" dirty="0">
+                <a:solidFill>
+                  <a:schemeClr val="tx1">
+                    <a:lumMod val="85000"/>
+                    <a:lumOff val="15000"/>
+                  </a:schemeClr>
+                </a:solidFill>
+                <a:latin typeface="나눔스퀘어 ExtraBold"/>
+                <a:cs typeface="Arial" panose="020B0604020202020204" pitchFamily="34" charset="0"/>
+              </a:rPr>
+              <a:t>Experiments</a:t>
+            </a:r>
+            <a:endParaRPr lang="ko-KR" altLang="en-US" sz="3600" b="1" dirty="0">
+              <a:solidFill>
+                <a:schemeClr val="tx1">
+                  <a:lumMod val="85000"/>
+                  <a:lumOff val="15000"/>
+                </a:schemeClr>
+              </a:solidFill>
+              <a:latin typeface="나눔스퀘어 ExtraBold"/>
+              <a:cs typeface="Arial" panose="020B0604020202020204" pitchFamily="34" charset="0"/>
+            </a:endParaRPr>
+          </a:p>
+        </p:txBody>
+      </p:sp>
+      <p:sp>
+        <p:nvSpPr>
+          <p:cNvPr id="3" name="내용 개체 틀 2">
+            <a:extLst>
+              <a:ext uri="{FF2B5EF4-FFF2-40B4-BE49-F238E27FC236}">
+                <a16:creationId xmlns:a16="http://schemas.microsoft.com/office/drawing/2014/main" id="{6F3C4966-F49A-47DB-93D9-018CD3BE693E}"/>
+              </a:ext>
+            </a:extLst>
+          </p:cNvPr>
+          <p:cNvSpPr>
+            <a:spLocks noGrp="1"/>
+          </p:cNvSpPr>
+          <p:nvPr>
+            <p:ph idx="1"/>
+          </p:nvPr>
+        </p:nvSpPr>
+        <p:spPr>
+          <a:xfrm>
+            <a:off x="990600" y="1690688"/>
+            <a:ext cx="10363200" cy="4351338"/>
+          </a:xfrm>
+        </p:spPr>
+        <p:txBody>
+          <a:bodyPr>
+            <a:normAutofit/>
+          </a:bodyPr>
+          <a:lstStyle/>
+          <a:p>
+            <a:pPr marL="432000" indent="-432000">
+              <a:lnSpc>
+                <a:spcPct val="100000"/>
+              </a:lnSpc>
+              <a:buClr>
+                <a:srgbClr val="004F9E"/>
+              </a:buClr>
+              <a:buFont typeface="Wingdings" panose="05000000000000000000" pitchFamily="2" charset="2"/>
+              <a:buChar char="§"/>
+            </a:pPr>
+            <a:r>
+              <a:rPr lang="en-US" altLang="ko-KR" sz="2000" dirty="0">
+                <a:latin typeface="나눔스퀘어 ExtraBold" panose="020B0600000101010101" pitchFamily="50" charset="-127"/>
+                <a:ea typeface="나눔스퀘어 ExtraBold" panose="020B0600000101010101" pitchFamily="50" charset="-127"/>
+                <a:cs typeface="Arial" panose="020B0604020202020204" pitchFamily="34" charset="0"/>
+              </a:rPr>
+              <a:t>B.</a:t>
+            </a:r>
+            <a:r>
+              <a:rPr lang="ko-KR" altLang="en-US" sz="2000" dirty="0">
+                <a:latin typeface="나눔스퀘어 ExtraBold" panose="020B0600000101010101" pitchFamily="50" charset="-127"/>
+                <a:ea typeface="나눔스퀘어 ExtraBold" panose="020B0600000101010101" pitchFamily="50" charset="-127"/>
+                <a:cs typeface="Arial" panose="020B0604020202020204" pitchFamily="34" charset="0"/>
+              </a:rPr>
+              <a:t> </a:t>
+            </a:r>
+            <a:r>
+              <a:rPr lang="en-US" altLang="ko-KR" sz="2000" dirty="0">
+                <a:latin typeface="나눔스퀘어 ExtraBold" panose="020B0600000101010101" pitchFamily="50" charset="-127"/>
+                <a:ea typeface="나눔스퀘어 ExtraBold" panose="020B0600000101010101" pitchFamily="50" charset="-127"/>
+                <a:cs typeface="Arial" panose="020B0604020202020204" pitchFamily="34" charset="0"/>
+              </a:rPr>
+              <a:t>Performance</a:t>
+            </a:r>
+            <a:r>
+              <a:rPr lang="ko-KR" altLang="en-US" sz="2000" dirty="0">
+                <a:latin typeface="나눔스퀘어 ExtraBold" panose="020B0600000101010101" pitchFamily="50" charset="-127"/>
+                <a:ea typeface="나눔스퀘어 ExtraBold" panose="020B0600000101010101" pitchFamily="50" charset="-127"/>
+                <a:cs typeface="Arial" panose="020B0604020202020204" pitchFamily="34" charset="0"/>
+              </a:rPr>
+              <a:t> </a:t>
+            </a:r>
+            <a:r>
+              <a:rPr lang="en-US" altLang="ko-KR" sz="2000" dirty="0">
+                <a:latin typeface="나눔스퀘어 ExtraBold" panose="020B0600000101010101" pitchFamily="50" charset="-127"/>
+                <a:ea typeface="나눔스퀘어 ExtraBold" panose="020B0600000101010101" pitchFamily="50" charset="-127"/>
+                <a:cs typeface="Arial" panose="020B0604020202020204" pitchFamily="34" charset="0"/>
+              </a:rPr>
+              <a:t>Comparison</a:t>
+            </a:r>
+          </a:p>
+          <a:p>
+            <a:pPr marL="889200" lvl="1" indent="-432000">
+              <a:lnSpc>
+                <a:spcPct val="100000"/>
+              </a:lnSpc>
+              <a:buClr>
+                <a:srgbClr val="004F9E"/>
+              </a:buClr>
+              <a:buFont typeface="Wingdings" panose="05000000000000000000" pitchFamily="2" charset="2"/>
+              <a:buChar char="§"/>
+            </a:pPr>
+            <a:r>
+              <a:rPr lang="en-US" altLang="ko-KR" sz="1600" dirty="0">
+                <a:latin typeface="나눔스퀘어 ExtraBold" panose="020B0600000101010101" pitchFamily="50" charset="-127"/>
+                <a:ea typeface="나눔스퀘어 ExtraBold" panose="020B0600000101010101" pitchFamily="50" charset="-127"/>
+                <a:cs typeface="Arial" panose="020B0604020202020204" pitchFamily="34" charset="0"/>
+              </a:rPr>
+              <a:t>RQ1: How is the performance of CI-</a:t>
+            </a:r>
+            <a:r>
+              <a:rPr lang="en-US" altLang="ko-KR" sz="1600" dirty="0" err="1">
+                <a:latin typeface="나눔스퀘어 ExtraBold" panose="020B0600000101010101" pitchFamily="50" charset="-127"/>
+                <a:ea typeface="나눔스퀘어 ExtraBold" panose="020B0600000101010101" pitchFamily="50" charset="-127"/>
+                <a:cs typeface="Arial" panose="020B0604020202020204" pitchFamily="34" charset="0"/>
+              </a:rPr>
+              <a:t>LightGCN</a:t>
+            </a:r>
+            <a:r>
+              <a:rPr lang="en-US" altLang="ko-KR" sz="1600" dirty="0">
+                <a:latin typeface="나눔스퀘어 ExtraBold" panose="020B0600000101010101" pitchFamily="50" charset="-127"/>
+                <a:ea typeface="나눔스퀘어 ExtraBold" panose="020B0600000101010101" pitchFamily="50" charset="-127"/>
+                <a:cs typeface="Arial" panose="020B0604020202020204" pitchFamily="34" charset="0"/>
+              </a:rPr>
+              <a:t> compared with the existing retraining methods?</a:t>
+            </a:r>
+          </a:p>
+          <a:p>
+            <a:pPr marL="889200" lvl="1" indent="-432000">
+              <a:lnSpc>
+                <a:spcPct val="100000"/>
+              </a:lnSpc>
+              <a:buClr>
+                <a:srgbClr val="004F9E"/>
+              </a:buClr>
+              <a:buFont typeface="Wingdings" panose="05000000000000000000" pitchFamily="2" charset="2"/>
+              <a:buChar char="§"/>
+            </a:pPr>
+            <a:endParaRPr lang="en-US" altLang="ko-KR" sz="1600" dirty="0">
+              <a:latin typeface="나눔스퀘어 ExtraBold" panose="020B0600000101010101" pitchFamily="50" charset="-127"/>
+              <a:ea typeface="나눔스퀘어 ExtraBold" panose="020B0600000101010101" pitchFamily="50" charset="-127"/>
+              <a:cs typeface="Arial" panose="020B0604020202020204" pitchFamily="34" charset="0"/>
+            </a:endParaRPr>
+          </a:p>
           <a:p>
             <a:pPr marL="432000" indent="-432000">
               <a:lnSpc>
@@ -19417,7 +21535,565 @@
             <a:fld id="{16A93642-25BD-4471-A422-0159119E9512}" type="slidenum">
               <a:rPr lang="ko-KR" altLang="en-US" smtClean="0"/>
               <a:pPr/>
-              <a:t>24</a:t>
+              <a:t>27</a:t>
+            </a:fld>
+            <a:endParaRPr lang="ko-KR" altLang="en-US" dirty="0"/>
+          </a:p>
+        </p:txBody>
+      </p:sp>
+      <p:pic>
+        <p:nvPicPr>
+          <p:cNvPr id="7" name="그림 6">
+            <a:extLst>
+              <a:ext uri="{FF2B5EF4-FFF2-40B4-BE49-F238E27FC236}">
+                <a16:creationId xmlns:a16="http://schemas.microsoft.com/office/drawing/2014/main" id="{757278D4-E798-CAB0-504E-D839E62C6EFE}"/>
+              </a:ext>
+            </a:extLst>
+          </p:cNvPr>
+          <p:cNvPicPr>
+            <a:picLocks noChangeAspect="1"/>
+          </p:cNvPicPr>
+          <p:nvPr/>
+        </p:nvPicPr>
+        <p:blipFill>
+          <a:blip r:embed="rId3"/>
+          <a:stretch>
+            <a:fillRect/>
+          </a:stretch>
+        </p:blipFill>
+        <p:spPr>
+          <a:xfrm>
+            <a:off x="409039" y="3015503"/>
+            <a:ext cx="6385302" cy="2711782"/>
+          </a:xfrm>
+          <a:prstGeom prst="rect">
+            <a:avLst/>
+          </a:prstGeom>
+        </p:spPr>
+      </p:pic>
+      <p:pic>
+        <p:nvPicPr>
+          <p:cNvPr id="9" name="그림 8">
+            <a:extLst>
+              <a:ext uri="{FF2B5EF4-FFF2-40B4-BE49-F238E27FC236}">
+                <a16:creationId xmlns:a16="http://schemas.microsoft.com/office/drawing/2014/main" id="{9B35664A-C12C-6756-E151-8B597BF048E9}"/>
+              </a:ext>
+            </a:extLst>
+          </p:cNvPr>
+          <p:cNvPicPr>
+            <a:picLocks noChangeAspect="1"/>
+          </p:cNvPicPr>
+          <p:nvPr/>
+        </p:nvPicPr>
+        <p:blipFill>
+          <a:blip r:embed="rId4"/>
+          <a:stretch>
+            <a:fillRect/>
+          </a:stretch>
+        </p:blipFill>
+        <p:spPr>
+          <a:xfrm>
+            <a:off x="6794341" y="3015503"/>
+            <a:ext cx="5074320" cy="2711782"/>
+          </a:xfrm>
+          <a:prstGeom prst="rect">
+            <a:avLst/>
+          </a:prstGeom>
+        </p:spPr>
+      </p:pic>
+    </p:spTree>
+    <p:extLst>
+      <p:ext uri="{BB962C8B-B14F-4D97-AF65-F5344CB8AC3E}">
+        <p14:creationId xmlns:p14="http://schemas.microsoft.com/office/powerpoint/2010/main" val="670268015"/>
+      </p:ext>
+    </p:extLst>
+  </p:cSld>
+  <p:clrMapOvr>
+    <a:masterClrMapping/>
+  </p:clrMapOvr>
+</p:sld>
+</file>
+
+<file path=ppt/slides/slide28.xml><?xml version="1.0" encoding="utf-8"?>
+<p:sld xmlns:a="http://schemas.openxmlformats.org/drawingml/2006/main" xmlns:r="http://schemas.openxmlformats.org/officeDocument/2006/relationships" xmlns:p="http://schemas.openxmlformats.org/presentationml/2006/main">
+  <p:cSld>
+    <p:spTree>
+      <p:nvGrpSpPr>
+        <p:cNvPr id="1" name=""/>
+        <p:cNvGrpSpPr/>
+        <p:nvPr/>
+      </p:nvGrpSpPr>
+      <p:grpSpPr>
+        <a:xfrm>
+          <a:off x="0" y="0"/>
+          <a:ext cx="0" cy="0"/>
+          <a:chOff x="0" y="0"/>
+          <a:chExt cx="0" cy="0"/>
+        </a:xfrm>
+      </p:grpSpPr>
+      <p:sp>
+        <p:nvSpPr>
+          <p:cNvPr id="2" name="제목 1">
+            <a:extLst>
+              <a:ext uri="{FF2B5EF4-FFF2-40B4-BE49-F238E27FC236}">
+                <a16:creationId xmlns:a16="http://schemas.microsoft.com/office/drawing/2014/main" id="{95CB7AEF-6056-404F-8222-D7A0008FE999}"/>
+              </a:ext>
+            </a:extLst>
+          </p:cNvPr>
+          <p:cNvSpPr>
+            <a:spLocks noGrp="1"/>
+          </p:cNvSpPr>
+          <p:nvPr>
+            <p:ph type="title"/>
+          </p:nvPr>
+        </p:nvSpPr>
+        <p:spPr/>
+        <p:txBody>
+          <a:bodyPr>
+            <a:normAutofit/>
+          </a:bodyPr>
+          <a:lstStyle/>
+          <a:p>
+            <a:r>
+              <a:rPr lang="en-US" altLang="ko-KR" sz="3600" b="1" dirty="0">
+                <a:solidFill>
+                  <a:schemeClr val="tx1">
+                    <a:lumMod val="85000"/>
+                    <a:lumOff val="15000"/>
+                  </a:schemeClr>
+                </a:solidFill>
+                <a:latin typeface="나눔스퀘어 ExtraBold"/>
+                <a:cs typeface="Arial" panose="020B0604020202020204" pitchFamily="34" charset="0"/>
+              </a:rPr>
+              <a:t>Experiments</a:t>
+            </a:r>
+            <a:endParaRPr lang="ko-KR" altLang="en-US" sz="3600" b="1" dirty="0">
+              <a:solidFill>
+                <a:schemeClr val="tx1">
+                  <a:lumMod val="85000"/>
+                  <a:lumOff val="15000"/>
+                </a:schemeClr>
+              </a:solidFill>
+              <a:latin typeface="나눔스퀘어 ExtraBold"/>
+              <a:cs typeface="Arial" panose="020B0604020202020204" pitchFamily="34" charset="0"/>
+            </a:endParaRPr>
+          </a:p>
+        </p:txBody>
+      </p:sp>
+      <p:sp>
+        <p:nvSpPr>
+          <p:cNvPr id="3" name="내용 개체 틀 2">
+            <a:extLst>
+              <a:ext uri="{FF2B5EF4-FFF2-40B4-BE49-F238E27FC236}">
+                <a16:creationId xmlns:a16="http://schemas.microsoft.com/office/drawing/2014/main" id="{6F3C4966-F49A-47DB-93D9-018CD3BE693E}"/>
+              </a:ext>
+            </a:extLst>
+          </p:cNvPr>
+          <p:cNvSpPr>
+            <a:spLocks noGrp="1"/>
+          </p:cNvSpPr>
+          <p:nvPr>
+            <p:ph idx="1"/>
+          </p:nvPr>
+        </p:nvSpPr>
+        <p:spPr>
+          <a:xfrm>
+            <a:off x="990600" y="1690688"/>
+            <a:ext cx="10363200" cy="4351338"/>
+          </a:xfrm>
+        </p:spPr>
+        <p:txBody>
+          <a:bodyPr>
+            <a:normAutofit/>
+          </a:bodyPr>
+          <a:lstStyle/>
+          <a:p>
+            <a:pPr marL="432000" indent="-432000">
+              <a:lnSpc>
+                <a:spcPct val="100000"/>
+              </a:lnSpc>
+              <a:buClr>
+                <a:srgbClr val="004F9E"/>
+              </a:buClr>
+              <a:buFont typeface="Wingdings" panose="05000000000000000000" pitchFamily="2" charset="2"/>
+              <a:buChar char="§"/>
+            </a:pPr>
+            <a:r>
+              <a:rPr lang="en-US" altLang="ko-KR" sz="2000" dirty="0">
+                <a:latin typeface="나눔스퀘어 ExtraBold" panose="020B0600000101010101" pitchFamily="50" charset="-127"/>
+                <a:ea typeface="나눔스퀘어 ExtraBold" panose="020B0600000101010101" pitchFamily="50" charset="-127"/>
+                <a:cs typeface="Arial" panose="020B0604020202020204" pitchFamily="34" charset="0"/>
+              </a:rPr>
+              <a:t>C.</a:t>
+            </a:r>
+            <a:r>
+              <a:rPr lang="ko-KR" altLang="en-US" sz="2000" dirty="0">
+                <a:latin typeface="나눔스퀘어 ExtraBold" panose="020B0600000101010101" pitchFamily="50" charset="-127"/>
+                <a:ea typeface="나눔스퀘어 ExtraBold" panose="020B0600000101010101" pitchFamily="50" charset="-127"/>
+                <a:cs typeface="Arial" panose="020B0604020202020204" pitchFamily="34" charset="0"/>
+              </a:rPr>
+              <a:t> </a:t>
+            </a:r>
+            <a:r>
+              <a:rPr lang="en-US" altLang="ko-KR" sz="2000" dirty="0">
+                <a:latin typeface="나눔스퀘어 ExtraBold" panose="020B0600000101010101" pitchFamily="50" charset="-127"/>
+                <a:ea typeface="나눔스퀘어 ExtraBold" panose="020B0600000101010101" pitchFamily="50" charset="-127"/>
+                <a:cs typeface="Arial" panose="020B0604020202020204" pitchFamily="34" charset="0"/>
+              </a:rPr>
+              <a:t>Ablation Study</a:t>
+            </a:r>
+          </a:p>
+          <a:p>
+            <a:pPr marL="889200" lvl="1" indent="-432000">
+              <a:lnSpc>
+                <a:spcPct val="100000"/>
+              </a:lnSpc>
+              <a:buClr>
+                <a:srgbClr val="004F9E"/>
+              </a:buClr>
+              <a:buFont typeface="Wingdings" panose="05000000000000000000" pitchFamily="2" charset="2"/>
+              <a:buChar char="§"/>
+            </a:pPr>
+            <a:r>
+              <a:rPr lang="en-US" altLang="ko-KR" sz="1600" dirty="0">
+                <a:latin typeface="나눔스퀘어 ExtraBold" panose="020B0600000101010101" pitchFamily="50" charset="-127"/>
+                <a:ea typeface="나눔스퀘어 ExtraBold" panose="020B0600000101010101" pitchFamily="50" charset="-127"/>
+                <a:cs typeface="Arial" panose="020B0604020202020204" pitchFamily="34" charset="0"/>
+              </a:rPr>
+              <a:t>RQ2: How do the CED and IGC operators affect the recommendation performance</a:t>
+            </a:r>
+          </a:p>
+          <a:p>
+            <a:pPr marL="889200" lvl="1" indent="-432000">
+              <a:lnSpc>
+                <a:spcPct val="100000"/>
+              </a:lnSpc>
+              <a:buClr>
+                <a:srgbClr val="004F9E"/>
+              </a:buClr>
+              <a:buFont typeface="Wingdings" panose="05000000000000000000" pitchFamily="2" charset="2"/>
+              <a:buChar char="§"/>
+            </a:pPr>
+            <a:r>
+              <a:rPr lang="en-US" altLang="ko-KR" sz="1600" dirty="0">
+                <a:latin typeface="나눔스퀘어 ExtraBold" panose="020B0600000101010101" pitchFamily="50" charset="-127"/>
+                <a:ea typeface="나눔스퀘어 ExtraBold" panose="020B0600000101010101" pitchFamily="50" charset="-127"/>
+                <a:cs typeface="Arial" panose="020B0604020202020204" pitchFamily="34" charset="0"/>
+              </a:rPr>
+              <a:t>1) I-</a:t>
+            </a:r>
+            <a:r>
+              <a:rPr lang="en-US" altLang="ko-KR" sz="1600" dirty="0" err="1">
+                <a:latin typeface="나눔스퀘어 ExtraBold" panose="020B0600000101010101" pitchFamily="50" charset="-127"/>
+                <a:ea typeface="나눔스퀘어 ExtraBold" panose="020B0600000101010101" pitchFamily="50" charset="-127"/>
+                <a:cs typeface="Arial" panose="020B0604020202020204" pitchFamily="34" charset="0"/>
+              </a:rPr>
+              <a:t>LightGCN</a:t>
+            </a:r>
+            <a:r>
+              <a:rPr lang="en-US" altLang="ko-KR" sz="1600" dirty="0">
+                <a:latin typeface="나눔스퀘어 ExtraBold" panose="020B0600000101010101" pitchFamily="50" charset="-127"/>
+                <a:ea typeface="나눔스퀘어 ExtraBold" panose="020B0600000101010101" pitchFamily="50" charset="-127"/>
+                <a:cs typeface="Arial" panose="020B0604020202020204" pitchFamily="34" charset="0"/>
+              </a:rPr>
+              <a:t>, which only applies IGC on </a:t>
+            </a:r>
+            <a:r>
+              <a:rPr lang="en-US" altLang="ko-KR" sz="1600" dirty="0" err="1">
+                <a:latin typeface="나눔스퀘어 ExtraBold" panose="020B0600000101010101" pitchFamily="50" charset="-127"/>
+                <a:ea typeface="나눔스퀘어 ExtraBold" panose="020B0600000101010101" pitchFamily="50" charset="-127"/>
+                <a:cs typeface="Arial" panose="020B0604020202020204" pitchFamily="34" charset="0"/>
+              </a:rPr>
+              <a:t>LightGCN</a:t>
+            </a:r>
+            <a:r>
+              <a:rPr lang="en-US" altLang="ko-KR" sz="1600" dirty="0">
+                <a:latin typeface="나눔스퀘어 ExtraBold" panose="020B0600000101010101" pitchFamily="50" charset="-127"/>
+                <a:ea typeface="나눔스퀘어 ExtraBold" panose="020B0600000101010101" pitchFamily="50" charset="-127"/>
+                <a:cs typeface="Arial" panose="020B0604020202020204" pitchFamily="34" charset="0"/>
+              </a:rPr>
+              <a:t>, i.e., removing CED</a:t>
+            </a:r>
+          </a:p>
+          <a:p>
+            <a:pPr marL="889200" lvl="1" indent="-432000">
+              <a:lnSpc>
+                <a:spcPct val="100000"/>
+              </a:lnSpc>
+              <a:buClr>
+                <a:srgbClr val="004F9E"/>
+              </a:buClr>
+              <a:buFont typeface="Wingdings" panose="05000000000000000000" pitchFamily="2" charset="2"/>
+              <a:buChar char="§"/>
+            </a:pPr>
+            <a:r>
+              <a:rPr lang="en-US" altLang="ko-KR" sz="1600" dirty="0">
+                <a:latin typeface="나눔스퀘어 ExtraBold" panose="020B0600000101010101" pitchFamily="50" charset="-127"/>
+                <a:ea typeface="나눔스퀘어 ExtraBold" panose="020B0600000101010101" pitchFamily="50" charset="-127"/>
+                <a:cs typeface="Arial" panose="020B0604020202020204" pitchFamily="34" charset="0"/>
+              </a:rPr>
+              <a:t>2) CI-</a:t>
+            </a:r>
+            <a:r>
+              <a:rPr lang="en-US" altLang="ko-KR" sz="1600" dirty="0" err="1">
+                <a:latin typeface="나눔스퀘어 ExtraBold" panose="020B0600000101010101" pitchFamily="50" charset="-127"/>
+                <a:ea typeface="나눔스퀘어 ExtraBold" panose="020B0600000101010101" pitchFamily="50" charset="-127"/>
+                <a:cs typeface="Arial" panose="020B0604020202020204" pitchFamily="34" charset="0"/>
+              </a:rPr>
+              <a:t>LightGCN</a:t>
+            </a:r>
+            <a:r>
+              <a:rPr lang="en-US" altLang="ko-KR" sz="1600" dirty="0">
+                <a:latin typeface="나눔스퀘어 ExtraBold" panose="020B0600000101010101" pitchFamily="50" charset="-127"/>
+                <a:ea typeface="나눔스퀘어 ExtraBold" panose="020B0600000101010101" pitchFamily="50" charset="-127"/>
+                <a:cs typeface="Arial" panose="020B0604020202020204" pitchFamily="34" charset="0"/>
+              </a:rPr>
+              <a:t>(T), which only uses CED in training</a:t>
+            </a:r>
+          </a:p>
+          <a:p>
+            <a:pPr marL="432000" indent="-432000">
+              <a:lnSpc>
+                <a:spcPct val="100000"/>
+              </a:lnSpc>
+              <a:buClr>
+                <a:srgbClr val="004F9E"/>
+              </a:buClr>
+              <a:buFont typeface="Wingdings" panose="05000000000000000000" pitchFamily="2" charset="2"/>
+              <a:buChar char="§"/>
+            </a:pPr>
+            <a:endParaRPr lang="en-US" altLang="ko-KR" sz="2000" dirty="0">
+              <a:latin typeface="나눔스퀘어 ExtraBold" panose="020B0600000101010101" pitchFamily="50" charset="-127"/>
+              <a:ea typeface="나눔스퀘어 ExtraBold" panose="020B0600000101010101" pitchFamily="50" charset="-127"/>
+              <a:cs typeface="Arial" panose="020B0604020202020204" pitchFamily="34" charset="0"/>
+            </a:endParaRPr>
+          </a:p>
+        </p:txBody>
+      </p:sp>
+      <p:sp>
+        <p:nvSpPr>
+          <p:cNvPr id="4" name="슬라이드 번호 개체 틀 3">
+            <a:extLst>
+              <a:ext uri="{FF2B5EF4-FFF2-40B4-BE49-F238E27FC236}">
+                <a16:creationId xmlns:a16="http://schemas.microsoft.com/office/drawing/2014/main" id="{4705CCFD-CA4E-4794-89D0-C3DF4603C893}"/>
+              </a:ext>
+            </a:extLst>
+          </p:cNvPr>
+          <p:cNvSpPr>
+            <a:spLocks noGrp="1"/>
+          </p:cNvSpPr>
+          <p:nvPr>
+            <p:ph type="sldNum" sz="quarter" idx="12"/>
+          </p:nvPr>
+        </p:nvSpPr>
+        <p:spPr/>
+        <p:txBody>
+          <a:bodyPr/>
+          <a:lstStyle/>
+          <a:p>
+            <a:fld id="{16A93642-25BD-4471-A422-0159119E9512}" type="slidenum">
+              <a:rPr lang="ko-KR" altLang="en-US" smtClean="0"/>
+              <a:pPr/>
+              <a:t>28</a:t>
+            </a:fld>
+            <a:endParaRPr lang="ko-KR" altLang="en-US" dirty="0"/>
+          </a:p>
+        </p:txBody>
+      </p:sp>
+      <p:pic>
+        <p:nvPicPr>
+          <p:cNvPr id="6" name="그림 5">
+            <a:extLst>
+              <a:ext uri="{FF2B5EF4-FFF2-40B4-BE49-F238E27FC236}">
+                <a16:creationId xmlns:a16="http://schemas.microsoft.com/office/drawing/2014/main" id="{8932A671-EC21-1FE5-5FC6-C9A804AD3280}"/>
+              </a:ext>
+            </a:extLst>
+          </p:cNvPr>
+          <p:cNvPicPr>
+            <a:picLocks noChangeAspect="1"/>
+          </p:cNvPicPr>
+          <p:nvPr/>
+        </p:nvPicPr>
+        <p:blipFill>
+          <a:blip r:embed="rId3"/>
+          <a:stretch>
+            <a:fillRect/>
+          </a:stretch>
+        </p:blipFill>
+        <p:spPr>
+          <a:xfrm>
+            <a:off x="3338117" y="3866357"/>
+            <a:ext cx="5668166" cy="1533739"/>
+          </a:xfrm>
+          <a:prstGeom prst="rect">
+            <a:avLst/>
+          </a:prstGeom>
+        </p:spPr>
+      </p:pic>
+    </p:spTree>
+    <p:extLst>
+      <p:ext uri="{BB962C8B-B14F-4D97-AF65-F5344CB8AC3E}">
+        <p14:creationId xmlns:p14="http://schemas.microsoft.com/office/powerpoint/2010/main" val="1459149146"/>
+      </p:ext>
+    </p:extLst>
+  </p:cSld>
+  <p:clrMapOvr>
+    <a:masterClrMapping/>
+  </p:clrMapOvr>
+</p:sld>
+</file>
+
+<file path=ppt/slides/slide29.xml><?xml version="1.0" encoding="utf-8"?>
+<p:sld xmlns:a="http://schemas.openxmlformats.org/drawingml/2006/main" xmlns:r="http://schemas.openxmlformats.org/officeDocument/2006/relationships" xmlns:p="http://schemas.openxmlformats.org/presentationml/2006/main">
+  <p:cSld>
+    <p:spTree>
+      <p:nvGrpSpPr>
+        <p:cNvPr id="1" name=""/>
+        <p:cNvGrpSpPr/>
+        <p:nvPr/>
+      </p:nvGrpSpPr>
+      <p:grpSpPr>
+        <a:xfrm>
+          <a:off x="0" y="0"/>
+          <a:ext cx="0" cy="0"/>
+          <a:chOff x="0" y="0"/>
+          <a:chExt cx="0" cy="0"/>
+        </a:xfrm>
+      </p:grpSpPr>
+      <p:sp>
+        <p:nvSpPr>
+          <p:cNvPr id="2" name="제목 1">
+            <a:extLst>
+              <a:ext uri="{FF2B5EF4-FFF2-40B4-BE49-F238E27FC236}">
+                <a16:creationId xmlns:a16="http://schemas.microsoft.com/office/drawing/2014/main" id="{95CB7AEF-6056-404F-8222-D7A0008FE999}"/>
+              </a:ext>
+            </a:extLst>
+          </p:cNvPr>
+          <p:cNvSpPr>
+            <a:spLocks noGrp="1"/>
+          </p:cNvSpPr>
+          <p:nvPr>
+            <p:ph type="title"/>
+          </p:nvPr>
+        </p:nvSpPr>
+        <p:spPr/>
+        <p:txBody>
+          <a:bodyPr>
+            <a:normAutofit/>
+          </a:bodyPr>
+          <a:lstStyle/>
+          <a:p>
+            <a:r>
+              <a:rPr lang="en-US" altLang="ko-KR" sz="3600" b="1" dirty="0">
+                <a:solidFill>
+                  <a:schemeClr val="tx1">
+                    <a:lumMod val="85000"/>
+                    <a:lumOff val="15000"/>
+                  </a:schemeClr>
+                </a:solidFill>
+                <a:latin typeface="나눔스퀘어 ExtraBold"/>
+                <a:cs typeface="Arial" panose="020B0604020202020204" pitchFamily="34" charset="0"/>
+              </a:rPr>
+              <a:t>Conclusion</a:t>
+            </a:r>
+            <a:endParaRPr lang="ko-KR" altLang="en-US" sz="3600" b="1" dirty="0">
+              <a:solidFill>
+                <a:schemeClr val="tx1">
+                  <a:lumMod val="85000"/>
+                  <a:lumOff val="15000"/>
+                </a:schemeClr>
+              </a:solidFill>
+              <a:latin typeface="나눔스퀘어 ExtraBold"/>
+              <a:cs typeface="Arial" panose="020B0604020202020204" pitchFamily="34" charset="0"/>
+            </a:endParaRPr>
+          </a:p>
+        </p:txBody>
+      </p:sp>
+      <p:sp>
+        <p:nvSpPr>
+          <p:cNvPr id="3" name="내용 개체 틀 2">
+            <a:extLst>
+              <a:ext uri="{FF2B5EF4-FFF2-40B4-BE49-F238E27FC236}">
+                <a16:creationId xmlns:a16="http://schemas.microsoft.com/office/drawing/2014/main" id="{6F3C4966-F49A-47DB-93D9-018CD3BE693E}"/>
+              </a:ext>
+            </a:extLst>
+          </p:cNvPr>
+          <p:cNvSpPr>
+            <a:spLocks noGrp="1"/>
+          </p:cNvSpPr>
+          <p:nvPr>
+            <p:ph idx="1"/>
+          </p:nvPr>
+        </p:nvSpPr>
+        <p:spPr>
+          <a:xfrm>
+            <a:off x="990600" y="1690688"/>
+            <a:ext cx="10363200" cy="4351338"/>
+          </a:xfrm>
+        </p:spPr>
+        <p:txBody>
+          <a:bodyPr>
+            <a:normAutofit/>
+          </a:bodyPr>
+          <a:lstStyle/>
+          <a:p>
+            <a:pPr marL="432000" indent="-432000">
+              <a:lnSpc>
+                <a:spcPct val="100000"/>
+              </a:lnSpc>
+              <a:buClr>
+                <a:srgbClr val="004F9E"/>
+              </a:buClr>
+              <a:buFont typeface="Wingdings" panose="05000000000000000000" pitchFamily="2" charset="2"/>
+              <a:buChar char="§"/>
+            </a:pPr>
+            <a:r>
+              <a:rPr lang="en-US" altLang="ko-KR" sz="2000" dirty="0">
+                <a:latin typeface="나눔스퀘어 ExtraBold" panose="020B0600000101010101" pitchFamily="50" charset="-127"/>
+                <a:ea typeface="나눔스퀘어 ExtraBold" panose="020B0600000101010101" pitchFamily="50" charset="-127"/>
+                <a:cs typeface="Arial" panose="020B0604020202020204" pitchFamily="34" charset="0"/>
+              </a:rPr>
+              <a:t>To achieve effective and efficient retraining, our analysis enlightens that </a:t>
+            </a:r>
+            <a:r>
+              <a:rPr lang="en-US" altLang="ko-KR" sz="2000" dirty="0">
+                <a:solidFill>
+                  <a:srgbClr val="FF0000"/>
+                </a:solidFill>
+                <a:latin typeface="나눔스퀘어 ExtraBold" panose="020B0600000101010101" pitchFamily="50" charset="-127"/>
+                <a:ea typeface="나눔스퀘어 ExtraBold" panose="020B0600000101010101" pitchFamily="50" charset="-127"/>
+                <a:cs typeface="Arial" panose="020B0604020202020204" pitchFamily="34" charset="0"/>
+              </a:rPr>
+              <a:t>the key lies in detaching the old graph from neighborhood aggregation, meanwhile reserving the long-term preference signal and refreshing the inactive nodes</a:t>
+            </a:r>
+          </a:p>
+        </p:txBody>
+      </p:sp>
+      <p:sp>
+        <p:nvSpPr>
+          <p:cNvPr id="4" name="슬라이드 번호 개체 틀 3">
+            <a:extLst>
+              <a:ext uri="{FF2B5EF4-FFF2-40B4-BE49-F238E27FC236}">
+                <a16:creationId xmlns:a16="http://schemas.microsoft.com/office/drawing/2014/main" id="{4705CCFD-CA4E-4794-89D0-C3DF4603C893}"/>
+              </a:ext>
+            </a:extLst>
+          </p:cNvPr>
+          <p:cNvSpPr>
+            <a:spLocks noGrp="1"/>
+          </p:cNvSpPr>
+          <p:nvPr>
+            <p:ph type="sldNum" sz="quarter" idx="12"/>
+          </p:nvPr>
+        </p:nvSpPr>
+        <p:spPr/>
+        <p:txBody>
+          <a:bodyPr/>
+          <a:lstStyle/>
+          <a:p>
+            <a:fld id="{16A93642-25BD-4471-A422-0159119E9512}" type="slidenum">
+              <a:rPr lang="ko-KR" altLang="en-US" smtClean="0"/>
+              <a:pPr/>
+              <a:t>29</a:t>
             </a:fld>
             <a:endParaRPr lang="ko-KR" altLang="en-US" dirty="0"/>
           </a:p>
@@ -19687,6 +22363,161 @@
     <p:extLst>
       <p:ext uri="{BB962C8B-B14F-4D97-AF65-F5344CB8AC3E}">
         <p14:creationId xmlns:p14="http://schemas.microsoft.com/office/powerpoint/2010/main" val="572499851"/>
+      </p:ext>
+    </p:extLst>
+  </p:cSld>
+  <p:clrMapOvr>
+    <a:masterClrMapping/>
+  </p:clrMapOvr>
+</p:sld>
+</file>
+
+<file path=ppt/slides/slide30.xml><?xml version="1.0" encoding="utf-8"?>
+<p:sld xmlns:a="http://schemas.openxmlformats.org/drawingml/2006/main" xmlns:r="http://schemas.openxmlformats.org/officeDocument/2006/relationships" xmlns:p="http://schemas.openxmlformats.org/presentationml/2006/main">
+  <p:cSld>
+    <p:spTree>
+      <p:nvGrpSpPr>
+        <p:cNvPr id="1" name=""/>
+        <p:cNvGrpSpPr/>
+        <p:nvPr/>
+      </p:nvGrpSpPr>
+      <p:grpSpPr>
+        <a:xfrm>
+          <a:off x="0" y="0"/>
+          <a:ext cx="0" cy="0"/>
+          <a:chOff x="0" y="0"/>
+          <a:chExt cx="0" cy="0"/>
+        </a:xfrm>
+      </p:grpSpPr>
+      <p:sp>
+        <p:nvSpPr>
+          <p:cNvPr id="2" name="제목 1">
+            <a:extLst>
+              <a:ext uri="{FF2B5EF4-FFF2-40B4-BE49-F238E27FC236}">
+                <a16:creationId xmlns:a16="http://schemas.microsoft.com/office/drawing/2014/main" id="{95CB7AEF-6056-404F-8222-D7A0008FE999}"/>
+              </a:ext>
+            </a:extLst>
+          </p:cNvPr>
+          <p:cNvSpPr>
+            <a:spLocks noGrp="1"/>
+          </p:cNvSpPr>
+          <p:nvPr>
+            <p:ph type="title"/>
+          </p:nvPr>
+        </p:nvSpPr>
+        <p:spPr/>
+        <p:txBody>
+          <a:bodyPr>
+            <a:normAutofit/>
+          </a:bodyPr>
+          <a:lstStyle/>
+          <a:p>
+            <a:r>
+              <a:rPr lang="en-US" altLang="ko-KR" sz="3600" b="1" dirty="0">
+                <a:solidFill>
+                  <a:schemeClr val="tx1">
+                    <a:lumMod val="85000"/>
+                    <a:lumOff val="15000"/>
+                  </a:schemeClr>
+                </a:solidFill>
+                <a:latin typeface="나눔스퀘어 ExtraBold"/>
+                <a:cs typeface="Arial" panose="020B0604020202020204" pitchFamily="34" charset="0"/>
+              </a:rPr>
+              <a:t>Introduction</a:t>
+            </a:r>
+            <a:endParaRPr lang="ko-KR" altLang="en-US" sz="3600" b="1" dirty="0">
+              <a:solidFill>
+                <a:schemeClr val="tx1">
+                  <a:lumMod val="85000"/>
+                  <a:lumOff val="15000"/>
+                </a:schemeClr>
+              </a:solidFill>
+              <a:latin typeface="나눔스퀘어 ExtraBold"/>
+              <a:cs typeface="Arial" panose="020B0604020202020204" pitchFamily="34" charset="0"/>
+            </a:endParaRPr>
+          </a:p>
+        </p:txBody>
+      </p:sp>
+      <p:sp>
+        <p:nvSpPr>
+          <p:cNvPr id="3" name="내용 개체 틀 2">
+            <a:extLst>
+              <a:ext uri="{FF2B5EF4-FFF2-40B4-BE49-F238E27FC236}">
+                <a16:creationId xmlns:a16="http://schemas.microsoft.com/office/drawing/2014/main" id="{6F3C4966-F49A-47DB-93D9-018CD3BE693E}"/>
+              </a:ext>
+            </a:extLst>
+          </p:cNvPr>
+          <p:cNvSpPr>
+            <a:spLocks noGrp="1"/>
+          </p:cNvSpPr>
+          <p:nvPr>
+            <p:ph idx="1"/>
+          </p:nvPr>
+        </p:nvSpPr>
+        <p:spPr>
+          <a:xfrm>
+            <a:off x="990600" y="1690688"/>
+            <a:ext cx="10363200" cy="4351338"/>
+          </a:xfrm>
+        </p:spPr>
+        <p:txBody>
+          <a:bodyPr>
+            <a:normAutofit/>
+          </a:bodyPr>
+          <a:lstStyle/>
+          <a:p>
+            <a:pPr marL="432000" indent="-432000">
+              <a:lnSpc>
+                <a:spcPct val="100000"/>
+              </a:lnSpc>
+              <a:buClr>
+                <a:srgbClr val="004F9E"/>
+              </a:buClr>
+              <a:buFont typeface="Wingdings" panose="05000000000000000000" pitchFamily="2" charset="2"/>
+              <a:buChar char="§"/>
+            </a:pPr>
+            <a:endParaRPr lang="en-US" altLang="ko-KR" sz="2000" dirty="0">
+              <a:latin typeface="나눔스퀘어 ExtraBold" panose="020B0600000101010101" pitchFamily="50" charset="-127"/>
+              <a:ea typeface="나눔스퀘어 ExtraBold" panose="020B0600000101010101" pitchFamily="50" charset="-127"/>
+              <a:cs typeface="Arial" panose="020B0604020202020204" pitchFamily="34" charset="0"/>
+            </a:endParaRPr>
+          </a:p>
+        </p:txBody>
+      </p:sp>
+      <p:sp>
+        <p:nvSpPr>
+          <p:cNvPr id="4" name="슬라이드 번호 개체 틀 3">
+            <a:extLst>
+              <a:ext uri="{FF2B5EF4-FFF2-40B4-BE49-F238E27FC236}">
+                <a16:creationId xmlns:a16="http://schemas.microsoft.com/office/drawing/2014/main" id="{4705CCFD-CA4E-4794-89D0-C3DF4603C893}"/>
+              </a:ext>
+            </a:extLst>
+          </p:cNvPr>
+          <p:cNvSpPr>
+            <a:spLocks noGrp="1"/>
+          </p:cNvSpPr>
+          <p:nvPr>
+            <p:ph type="sldNum" sz="quarter" idx="12"/>
+          </p:nvPr>
+        </p:nvSpPr>
+        <p:spPr/>
+        <p:txBody>
+          <a:bodyPr/>
+          <a:lstStyle/>
+          <a:p>
+            <a:fld id="{16A93642-25BD-4471-A422-0159119E9512}" type="slidenum">
+              <a:rPr lang="ko-KR" altLang="en-US" smtClean="0"/>
+              <a:pPr/>
+              <a:t>30</a:t>
+            </a:fld>
+            <a:endParaRPr lang="ko-KR" altLang="en-US" dirty="0"/>
+          </a:p>
+        </p:txBody>
+      </p:sp>
+    </p:spTree>
+    <p:extLst>
+      <p:ext uri="{BB962C8B-B14F-4D97-AF65-F5344CB8AC3E}">
+        <p14:creationId xmlns:p14="http://schemas.microsoft.com/office/powerpoint/2010/main" val="677449488"/>
       </p:ext>
     </p:extLst>
   </p:cSld>

</xml_diff>